<commit_message>
bug fixes in the lsu/mmu and the cache fsm. Also added test for biglittle configs. Updated writeups to first submitted draft
</commit_message>
<xml_diff>
--- a/doc/gatech-thesis-1.8/myfigures/cache_microarch.pptx
+++ b/doc/gatech-thesis-1.8/myfigures/cache_microarch.pptx
@@ -288,7 +288,8 @@
           <a:p>
             <a:fld id="{73B46577-5A20-47DA-9744-466949748B40}" type="datetimeFigureOut">
               <a:rPr lang="en-US" smtClean="0"/>
-              <a:t>12/6/2013</a:t>
+              <a:pPr/>
+              <a:t>12/13/2013</a:t>
             </a:fld>
             <a:endParaRPr lang="en-US"/>
           </a:p>
@@ -330,6 +331,7 @@
           <a:p>
             <a:fld id="{E24C6BEA-8630-4FBA-B0A1-E89983643FF7}" type="slidenum">
               <a:rPr lang="en-US" smtClean="0"/>
+              <a:pPr/>
               <a:t>‹#›</a:t>
             </a:fld>
             <a:endParaRPr lang="en-US"/>
@@ -453,7 +455,8 @@
           <a:p>
             <a:fld id="{73B46577-5A20-47DA-9744-466949748B40}" type="datetimeFigureOut">
               <a:rPr lang="en-US" smtClean="0"/>
-              <a:t>12/6/2013</a:t>
+              <a:pPr/>
+              <a:t>12/13/2013</a:t>
             </a:fld>
             <a:endParaRPr lang="en-US"/>
           </a:p>
@@ -495,6 +498,7 @@
           <a:p>
             <a:fld id="{E24C6BEA-8630-4FBA-B0A1-E89983643FF7}" type="slidenum">
               <a:rPr lang="en-US" smtClean="0"/>
+              <a:pPr/>
               <a:t>‹#›</a:t>
             </a:fld>
             <a:endParaRPr lang="en-US"/>
@@ -628,7 +632,8 @@
           <a:p>
             <a:fld id="{73B46577-5A20-47DA-9744-466949748B40}" type="datetimeFigureOut">
               <a:rPr lang="en-US" smtClean="0"/>
-              <a:t>12/6/2013</a:t>
+              <a:pPr/>
+              <a:t>12/13/2013</a:t>
             </a:fld>
             <a:endParaRPr lang="en-US"/>
           </a:p>
@@ -670,6 +675,7 @@
           <a:p>
             <a:fld id="{E24C6BEA-8630-4FBA-B0A1-E89983643FF7}" type="slidenum">
               <a:rPr lang="en-US" smtClean="0"/>
+              <a:pPr/>
               <a:t>‹#›</a:t>
             </a:fld>
             <a:endParaRPr lang="en-US"/>
@@ -793,7 +799,8 @@
           <a:p>
             <a:fld id="{73B46577-5A20-47DA-9744-466949748B40}" type="datetimeFigureOut">
               <a:rPr lang="en-US" smtClean="0"/>
-              <a:t>12/6/2013</a:t>
+              <a:pPr/>
+              <a:t>12/13/2013</a:t>
             </a:fld>
             <a:endParaRPr lang="en-US"/>
           </a:p>
@@ -835,6 +842,7 @@
           <a:p>
             <a:fld id="{E24C6BEA-8630-4FBA-B0A1-E89983643FF7}" type="slidenum">
               <a:rPr lang="en-US" smtClean="0"/>
+              <a:pPr/>
               <a:t>‹#›</a:t>
             </a:fld>
             <a:endParaRPr lang="en-US"/>
@@ -1034,7 +1042,8 @@
           <a:p>
             <a:fld id="{73B46577-5A20-47DA-9744-466949748B40}" type="datetimeFigureOut">
               <a:rPr lang="en-US" smtClean="0"/>
-              <a:t>12/6/2013</a:t>
+              <a:pPr/>
+              <a:t>12/13/2013</a:t>
             </a:fld>
             <a:endParaRPr lang="en-US"/>
           </a:p>
@@ -1076,6 +1085,7 @@
           <a:p>
             <a:fld id="{E24C6BEA-8630-4FBA-B0A1-E89983643FF7}" type="slidenum">
               <a:rPr lang="en-US" smtClean="0"/>
+              <a:pPr/>
               <a:t>‹#›</a:t>
             </a:fld>
             <a:endParaRPr lang="en-US"/>
@@ -1317,7 +1327,8 @@
           <a:p>
             <a:fld id="{73B46577-5A20-47DA-9744-466949748B40}" type="datetimeFigureOut">
               <a:rPr lang="en-US" smtClean="0"/>
-              <a:t>12/6/2013</a:t>
+              <a:pPr/>
+              <a:t>12/13/2013</a:t>
             </a:fld>
             <a:endParaRPr lang="en-US"/>
           </a:p>
@@ -1359,6 +1370,7 @@
           <a:p>
             <a:fld id="{E24C6BEA-8630-4FBA-B0A1-E89983643FF7}" type="slidenum">
               <a:rPr lang="en-US" smtClean="0"/>
+              <a:pPr/>
               <a:t>‹#›</a:t>
             </a:fld>
             <a:endParaRPr lang="en-US"/>
@@ -1734,7 +1746,8 @@
           <a:p>
             <a:fld id="{73B46577-5A20-47DA-9744-466949748B40}" type="datetimeFigureOut">
               <a:rPr lang="en-US" smtClean="0"/>
-              <a:t>12/6/2013</a:t>
+              <a:pPr/>
+              <a:t>12/13/2013</a:t>
             </a:fld>
             <a:endParaRPr lang="en-US"/>
           </a:p>
@@ -1776,6 +1789,7 @@
           <a:p>
             <a:fld id="{E24C6BEA-8630-4FBA-B0A1-E89983643FF7}" type="slidenum">
               <a:rPr lang="en-US" smtClean="0"/>
+              <a:pPr/>
               <a:t>‹#›</a:t>
             </a:fld>
             <a:endParaRPr lang="en-US"/>
@@ -1847,7 +1861,8 @@
           <a:p>
             <a:fld id="{73B46577-5A20-47DA-9744-466949748B40}" type="datetimeFigureOut">
               <a:rPr lang="en-US" smtClean="0"/>
-              <a:t>12/6/2013</a:t>
+              <a:pPr/>
+              <a:t>12/13/2013</a:t>
             </a:fld>
             <a:endParaRPr lang="en-US"/>
           </a:p>
@@ -1889,6 +1904,7 @@
           <a:p>
             <a:fld id="{E24C6BEA-8630-4FBA-B0A1-E89983643FF7}" type="slidenum">
               <a:rPr lang="en-US" smtClean="0"/>
+              <a:pPr/>
               <a:t>‹#›</a:t>
             </a:fld>
             <a:endParaRPr lang="en-US"/>
@@ -1937,7 +1953,8 @@
           <a:p>
             <a:fld id="{73B46577-5A20-47DA-9744-466949748B40}" type="datetimeFigureOut">
               <a:rPr lang="en-US" smtClean="0"/>
-              <a:t>12/6/2013</a:t>
+              <a:pPr/>
+              <a:t>12/13/2013</a:t>
             </a:fld>
             <a:endParaRPr lang="en-US"/>
           </a:p>
@@ -1979,6 +1996,7 @@
           <a:p>
             <a:fld id="{E24C6BEA-8630-4FBA-B0A1-E89983643FF7}" type="slidenum">
               <a:rPr lang="en-US" smtClean="0"/>
+              <a:pPr/>
               <a:t>‹#›</a:t>
             </a:fld>
             <a:endParaRPr lang="en-US"/>
@@ -2209,7 +2227,8 @@
           <a:p>
             <a:fld id="{73B46577-5A20-47DA-9744-466949748B40}" type="datetimeFigureOut">
               <a:rPr lang="en-US" smtClean="0"/>
-              <a:t>12/6/2013</a:t>
+              <a:pPr/>
+              <a:t>12/13/2013</a:t>
             </a:fld>
             <a:endParaRPr lang="en-US"/>
           </a:p>
@@ -2251,6 +2270,7 @@
           <a:p>
             <a:fld id="{E24C6BEA-8630-4FBA-B0A1-E89983643FF7}" type="slidenum">
               <a:rPr lang="en-US" smtClean="0"/>
+              <a:pPr/>
               <a:t>‹#›</a:t>
             </a:fld>
             <a:endParaRPr lang="en-US"/>
@@ -2457,7 +2477,8 @@
           <a:p>
             <a:fld id="{73B46577-5A20-47DA-9744-466949748B40}" type="datetimeFigureOut">
               <a:rPr lang="en-US" smtClean="0"/>
-              <a:t>12/6/2013</a:t>
+              <a:pPr/>
+              <a:t>12/13/2013</a:t>
             </a:fld>
             <a:endParaRPr lang="en-US"/>
           </a:p>
@@ -2499,6 +2520,7 @@
           <a:p>
             <a:fld id="{E24C6BEA-8630-4FBA-B0A1-E89983643FF7}" type="slidenum">
               <a:rPr lang="en-US" smtClean="0"/>
+              <a:pPr/>
               <a:t>‹#›</a:t>
             </a:fld>
             <a:endParaRPr lang="en-US"/>
@@ -2665,7 +2687,8 @@
           <a:p>
             <a:fld id="{73B46577-5A20-47DA-9744-466949748B40}" type="datetimeFigureOut">
               <a:rPr lang="en-US" smtClean="0"/>
-              <a:t>12/6/2013</a:t>
+              <a:pPr/>
+              <a:t>12/13/2013</a:t>
             </a:fld>
             <a:endParaRPr lang="en-US"/>
           </a:p>
@@ -2743,6 +2766,7 @@
           <a:p>
             <a:fld id="{E24C6BEA-8630-4FBA-B0A1-E89983643FF7}" type="slidenum">
               <a:rPr lang="en-US" smtClean="0"/>
+              <a:pPr/>
               <a:t>‹#›</a:t>
             </a:fld>
             <a:endParaRPr lang="en-US"/>
@@ -3035,6 +3059,82 @@
           <a:chExt cx="0" cy="0"/>
         </a:xfrm>
       </p:grpSpPr>
+      <p:sp>
+        <p:nvSpPr>
+          <p:cNvPr id="71" name="Rectangle 70"/>
+          <p:cNvSpPr/>
+          <p:nvPr/>
+        </p:nvSpPr>
+        <p:spPr>
+          <a:xfrm>
+            <a:off x="1143000" y="1524000"/>
+            <a:ext cx="1905000" cy="1447800"/>
+          </a:xfrm>
+          <a:prstGeom prst="rect">
+            <a:avLst/>
+          </a:prstGeom>
+        </p:spPr>
+        <p:style>
+          <a:lnRef idx="1">
+            <a:schemeClr val="dk1"/>
+          </a:lnRef>
+          <a:fillRef idx="2">
+            <a:schemeClr val="dk1"/>
+          </a:fillRef>
+          <a:effectRef idx="1">
+            <a:schemeClr val="dk1"/>
+          </a:effectRef>
+          <a:fontRef idx="minor">
+            <a:schemeClr val="dk1"/>
+          </a:fontRef>
+        </p:style>
+        <p:txBody>
+          <a:bodyPr rtlCol="0" anchor="ctr"/>
+          <a:lstStyle/>
+          <a:p>
+            <a:pPr algn="ctr"/>
+            <a:endParaRPr lang="en-US"/>
+          </a:p>
+        </p:txBody>
+      </p:sp>
+      <p:sp>
+        <p:nvSpPr>
+          <p:cNvPr id="70" name="Rectangle 69"/>
+          <p:cNvSpPr/>
+          <p:nvPr/>
+        </p:nvSpPr>
+        <p:spPr>
+          <a:xfrm>
+            <a:off x="4495800" y="1524000"/>
+            <a:ext cx="3505200" cy="1447800"/>
+          </a:xfrm>
+          <a:prstGeom prst="rect">
+            <a:avLst/>
+          </a:prstGeom>
+        </p:spPr>
+        <p:style>
+          <a:lnRef idx="1">
+            <a:schemeClr val="dk1"/>
+          </a:lnRef>
+          <a:fillRef idx="2">
+            <a:schemeClr val="dk1"/>
+          </a:fillRef>
+          <a:effectRef idx="1">
+            <a:schemeClr val="dk1"/>
+          </a:effectRef>
+          <a:fontRef idx="minor">
+            <a:schemeClr val="dk1"/>
+          </a:fontRef>
+        </p:style>
+        <p:txBody>
+          <a:bodyPr rtlCol="0" anchor="ctr"/>
+          <a:lstStyle/>
+          <a:p>
+            <a:pPr algn="ctr"/>
+            <a:endParaRPr lang="en-US"/>
+          </a:p>
+        </p:txBody>
+      </p:sp>
       <p:graphicFrame>
         <p:nvGraphicFramePr>
           <p:cNvPr id="4" name="Table 3"/>
@@ -3044,8 +3144,8 @@
           <p:nvPr/>
         </p:nvGraphicFramePr>
         <p:xfrm>
-          <a:off x="4495800" y="1524000"/>
-          <a:ext cx="3505200" cy="1463040"/>
+          <a:off x="4495800" y="2286000"/>
+          <a:ext cx="3505200" cy="304800"/>
         </p:xfrm>
         <a:graphic>
           <a:graphicData uri="http://schemas.openxmlformats.org/drawingml/2006/table">
@@ -3063,14 +3163,14 @@
                 <a:gridCol w="438150"/>
                 <a:gridCol w="438150"/>
               </a:tblGrid>
-              <a:tr h="152400">
+              <a:tr h="301752">
                 <a:tc>
                   <a:txBody>
                     <a:bodyPr/>
                     <a:lstStyle/>
                     <a:p>
                       <a:pPr algn="ctr"/>
-                      <a:endParaRPr lang="en-US" dirty="0"/>
+                      <a:endParaRPr lang="en-US" sz="1400" dirty="0"/>
                     </a:p>
                   </a:txBody>
                   <a:tcPr>
@@ -3132,7 +3232,7 @@
                     <a:lstStyle/>
                     <a:p>
                       <a:pPr algn="ctr"/>
-                      <a:endParaRPr lang="en-US" dirty="0"/>
+                      <a:endParaRPr lang="en-US" sz="1400" dirty="0"/>
                     </a:p>
                   </a:txBody>
                   <a:tcPr>
@@ -3194,7 +3294,7 @@
                     <a:lstStyle/>
                     <a:p>
                       <a:pPr algn="ctr"/>
-                      <a:endParaRPr lang="en-US" dirty="0"/>
+                      <a:endParaRPr lang="en-US" sz="1400" dirty="0"/>
                     </a:p>
                   </a:txBody>
                   <a:tcPr>
@@ -3256,7 +3356,7 @@
                     <a:lstStyle/>
                     <a:p>
                       <a:pPr algn="ctr"/>
-                      <a:endParaRPr lang="en-US" dirty="0"/>
+                      <a:endParaRPr lang="en-US" sz="1400" dirty="0"/>
                     </a:p>
                   </a:txBody>
                   <a:tcPr>
@@ -3318,7 +3418,7 @@
                     <a:lstStyle/>
                     <a:p>
                       <a:pPr algn="ctr"/>
-                      <a:endParaRPr lang="en-US"/>
+                      <a:endParaRPr lang="en-US" sz="1400" dirty="0"/>
                     </a:p>
                   </a:txBody>
                   <a:tcPr>
@@ -3380,7 +3480,7 @@
                     <a:lstStyle/>
                     <a:p>
                       <a:pPr algn="ctr"/>
-                      <a:endParaRPr lang="en-US"/>
+                      <a:endParaRPr lang="en-US" sz="1400" dirty="0"/>
                     </a:p>
                   </a:txBody>
                   <a:tcPr>
@@ -3442,7 +3542,7 @@
                     <a:lstStyle/>
                     <a:p>
                       <a:pPr algn="ctr"/>
-                      <a:endParaRPr lang="en-US"/>
+                      <a:endParaRPr lang="en-US" sz="1400"/>
                     </a:p>
                   </a:txBody>
                   <a:tcPr>
@@ -3504,1493 +3604,7 @@
                     <a:lstStyle/>
                     <a:p>
                       <a:pPr algn="ctr"/>
-                      <a:endParaRPr lang="en-US" dirty="0"/>
-                    </a:p>
-                  </a:txBody>
-                  <a:tcPr>
-                    <a:lnL w="12700" cap="flat" cmpd="sng" algn="ctr">
-                      <a:solidFill>
-                        <a:schemeClr val="tx1"/>
-                      </a:solidFill>
-                      <a:prstDash val="solid"/>
-                      <a:round/>
-                      <a:headEnd type="none" w="med" len="med"/>
-                      <a:tailEnd type="none" w="med" len="med"/>
-                    </a:lnL>
-                    <a:lnR w="12700" cap="flat" cmpd="sng" algn="ctr">
-                      <a:solidFill>
-                        <a:schemeClr val="tx1"/>
-                      </a:solidFill>
-                      <a:prstDash val="solid"/>
-                      <a:round/>
-                      <a:headEnd type="none" w="med" len="med"/>
-                      <a:tailEnd type="none" w="med" len="med"/>
-                    </a:lnR>
-                    <a:lnT w="12700" cap="flat" cmpd="sng" algn="ctr">
-                      <a:solidFill>
-                        <a:schemeClr val="tx1"/>
-                      </a:solidFill>
-                      <a:prstDash val="solid"/>
-                      <a:round/>
-                      <a:headEnd type="none" w="med" len="med"/>
-                      <a:tailEnd type="none" w="med" len="med"/>
-                    </a:lnT>
-                    <a:lnB w="12700" cap="flat" cmpd="sng" algn="ctr">
-                      <a:solidFill>
-                        <a:schemeClr val="tx1"/>
-                      </a:solidFill>
-                      <a:prstDash val="solid"/>
-                      <a:round/>
-                      <a:headEnd type="none" w="med" len="med"/>
-                      <a:tailEnd type="none" w="med" len="med"/>
-                    </a:lnB>
-                    <a:lnTlToBr w="12700" cmpd="sng">
-                      <a:noFill/>
-                      <a:prstDash val="solid"/>
-                    </a:lnTlToBr>
-                    <a:lnBlToTr w="12700" cmpd="sng">
-                      <a:noFill/>
-                      <a:prstDash val="solid"/>
-                    </a:lnBlToTr>
-                    <a:solidFill>
-                      <a:schemeClr val="tx2">
-                        <a:lumMod val="20000"/>
-                        <a:lumOff val="80000"/>
-                      </a:schemeClr>
-                    </a:solidFill>
-                  </a:tcPr>
-                </a:tc>
-              </a:tr>
-              <a:tr h="152400">
-                <a:tc>
-                  <a:txBody>
-                    <a:bodyPr/>
-                    <a:lstStyle/>
-                    <a:p>
-                      <a:pPr algn="ctr"/>
-                      <a:endParaRPr lang="en-US" dirty="0"/>
-                    </a:p>
-                  </a:txBody>
-                  <a:tcPr>
-                    <a:lnL w="12700" cap="flat" cmpd="sng" algn="ctr">
-                      <a:solidFill>
-                        <a:schemeClr val="tx1"/>
-                      </a:solidFill>
-                      <a:prstDash val="solid"/>
-                      <a:round/>
-                      <a:headEnd type="none" w="med" len="med"/>
-                      <a:tailEnd type="none" w="med" len="med"/>
-                    </a:lnL>
-                    <a:lnR w="12700" cap="flat" cmpd="sng" algn="ctr">
-                      <a:solidFill>
-                        <a:schemeClr val="tx1"/>
-                      </a:solidFill>
-                      <a:prstDash val="solid"/>
-                      <a:round/>
-                      <a:headEnd type="none" w="med" len="med"/>
-                      <a:tailEnd type="none" w="med" len="med"/>
-                    </a:lnR>
-                    <a:lnT w="12700" cap="flat" cmpd="sng" algn="ctr">
-                      <a:solidFill>
-                        <a:schemeClr val="tx1"/>
-                      </a:solidFill>
-                      <a:prstDash val="solid"/>
-                      <a:round/>
-                      <a:headEnd type="none" w="med" len="med"/>
-                      <a:tailEnd type="none" w="med" len="med"/>
-                    </a:lnT>
-                    <a:lnB w="12700" cap="flat" cmpd="sng" algn="ctr">
-                      <a:solidFill>
-                        <a:schemeClr val="tx1"/>
-                      </a:solidFill>
-                      <a:prstDash val="solid"/>
-                      <a:round/>
-                      <a:headEnd type="none" w="med" len="med"/>
-                      <a:tailEnd type="none" w="med" len="med"/>
-                    </a:lnB>
-                    <a:lnTlToBr w="12700" cmpd="sng">
-                      <a:noFill/>
-                      <a:prstDash val="solid"/>
-                    </a:lnTlToBr>
-                    <a:lnBlToTr w="12700" cmpd="sng">
-                      <a:noFill/>
-                      <a:prstDash val="solid"/>
-                    </a:lnBlToTr>
-                    <a:solidFill>
-                      <a:schemeClr val="tx2">
-                        <a:lumMod val="20000"/>
-                        <a:lumOff val="80000"/>
-                      </a:schemeClr>
-                    </a:solidFill>
-                  </a:tcPr>
-                </a:tc>
-                <a:tc>
-                  <a:txBody>
-                    <a:bodyPr/>
-                    <a:lstStyle/>
-                    <a:p>
-                      <a:pPr algn="ctr"/>
-                      <a:endParaRPr lang="en-US"/>
-                    </a:p>
-                  </a:txBody>
-                  <a:tcPr>
-                    <a:lnL w="12700" cap="flat" cmpd="sng" algn="ctr">
-                      <a:solidFill>
-                        <a:schemeClr val="tx1"/>
-                      </a:solidFill>
-                      <a:prstDash val="solid"/>
-                      <a:round/>
-                      <a:headEnd type="none" w="med" len="med"/>
-                      <a:tailEnd type="none" w="med" len="med"/>
-                    </a:lnL>
-                    <a:lnR w="12700" cap="flat" cmpd="sng" algn="ctr">
-                      <a:solidFill>
-                        <a:schemeClr val="tx1"/>
-                      </a:solidFill>
-                      <a:prstDash val="solid"/>
-                      <a:round/>
-                      <a:headEnd type="none" w="med" len="med"/>
-                      <a:tailEnd type="none" w="med" len="med"/>
-                    </a:lnR>
-                    <a:lnT w="12700" cap="flat" cmpd="sng" algn="ctr">
-                      <a:solidFill>
-                        <a:schemeClr val="tx1"/>
-                      </a:solidFill>
-                      <a:prstDash val="solid"/>
-                      <a:round/>
-                      <a:headEnd type="none" w="med" len="med"/>
-                      <a:tailEnd type="none" w="med" len="med"/>
-                    </a:lnT>
-                    <a:lnB w="12700" cap="flat" cmpd="sng" algn="ctr">
-                      <a:solidFill>
-                        <a:schemeClr val="tx1"/>
-                      </a:solidFill>
-                      <a:prstDash val="solid"/>
-                      <a:round/>
-                      <a:headEnd type="none" w="med" len="med"/>
-                      <a:tailEnd type="none" w="med" len="med"/>
-                    </a:lnB>
-                    <a:lnTlToBr w="12700" cmpd="sng">
-                      <a:noFill/>
-                      <a:prstDash val="solid"/>
-                    </a:lnTlToBr>
-                    <a:lnBlToTr w="12700" cmpd="sng">
-                      <a:noFill/>
-                      <a:prstDash val="solid"/>
-                    </a:lnBlToTr>
-                    <a:solidFill>
-                      <a:schemeClr val="tx2">
-                        <a:lumMod val="20000"/>
-                        <a:lumOff val="80000"/>
-                      </a:schemeClr>
-                    </a:solidFill>
-                  </a:tcPr>
-                </a:tc>
-                <a:tc>
-                  <a:txBody>
-                    <a:bodyPr/>
-                    <a:lstStyle/>
-                    <a:p>
-                      <a:pPr algn="ctr"/>
-                      <a:endParaRPr lang="en-US" dirty="0"/>
-                    </a:p>
-                  </a:txBody>
-                  <a:tcPr>
-                    <a:lnL w="12700" cap="flat" cmpd="sng" algn="ctr">
-                      <a:solidFill>
-                        <a:schemeClr val="tx1"/>
-                      </a:solidFill>
-                      <a:prstDash val="solid"/>
-                      <a:round/>
-                      <a:headEnd type="none" w="med" len="med"/>
-                      <a:tailEnd type="none" w="med" len="med"/>
-                    </a:lnL>
-                    <a:lnR w="12700" cap="flat" cmpd="sng" algn="ctr">
-                      <a:solidFill>
-                        <a:schemeClr val="tx1"/>
-                      </a:solidFill>
-                      <a:prstDash val="solid"/>
-                      <a:round/>
-                      <a:headEnd type="none" w="med" len="med"/>
-                      <a:tailEnd type="none" w="med" len="med"/>
-                    </a:lnR>
-                    <a:lnT w="12700" cap="flat" cmpd="sng" algn="ctr">
-                      <a:solidFill>
-                        <a:schemeClr val="tx1"/>
-                      </a:solidFill>
-                      <a:prstDash val="solid"/>
-                      <a:round/>
-                      <a:headEnd type="none" w="med" len="med"/>
-                      <a:tailEnd type="none" w="med" len="med"/>
-                    </a:lnT>
-                    <a:lnB w="12700" cap="flat" cmpd="sng" algn="ctr">
-                      <a:solidFill>
-                        <a:schemeClr val="tx1"/>
-                      </a:solidFill>
-                      <a:prstDash val="solid"/>
-                      <a:round/>
-                      <a:headEnd type="none" w="med" len="med"/>
-                      <a:tailEnd type="none" w="med" len="med"/>
-                    </a:lnB>
-                    <a:lnTlToBr w="12700" cmpd="sng">
-                      <a:noFill/>
-                      <a:prstDash val="solid"/>
-                    </a:lnTlToBr>
-                    <a:lnBlToTr w="12700" cmpd="sng">
-                      <a:noFill/>
-                      <a:prstDash val="solid"/>
-                    </a:lnBlToTr>
-                    <a:solidFill>
-                      <a:schemeClr val="tx2">
-                        <a:lumMod val="20000"/>
-                        <a:lumOff val="80000"/>
-                      </a:schemeClr>
-                    </a:solidFill>
-                  </a:tcPr>
-                </a:tc>
-                <a:tc>
-                  <a:txBody>
-                    <a:bodyPr/>
-                    <a:lstStyle/>
-                    <a:p>
-                      <a:pPr algn="ctr"/>
-                      <a:endParaRPr lang="en-US" dirty="0"/>
-                    </a:p>
-                  </a:txBody>
-                  <a:tcPr>
-                    <a:lnL w="12700" cap="flat" cmpd="sng" algn="ctr">
-                      <a:solidFill>
-                        <a:schemeClr val="tx1"/>
-                      </a:solidFill>
-                      <a:prstDash val="solid"/>
-                      <a:round/>
-                      <a:headEnd type="none" w="med" len="med"/>
-                      <a:tailEnd type="none" w="med" len="med"/>
-                    </a:lnL>
-                    <a:lnR w="12700" cap="flat" cmpd="sng" algn="ctr">
-                      <a:solidFill>
-                        <a:schemeClr val="tx1"/>
-                      </a:solidFill>
-                      <a:prstDash val="solid"/>
-                      <a:round/>
-                      <a:headEnd type="none" w="med" len="med"/>
-                      <a:tailEnd type="none" w="med" len="med"/>
-                    </a:lnR>
-                    <a:lnT w="12700" cap="flat" cmpd="sng" algn="ctr">
-                      <a:solidFill>
-                        <a:schemeClr val="tx1"/>
-                      </a:solidFill>
-                      <a:prstDash val="solid"/>
-                      <a:round/>
-                      <a:headEnd type="none" w="med" len="med"/>
-                      <a:tailEnd type="none" w="med" len="med"/>
-                    </a:lnT>
-                    <a:lnB w="12700" cap="flat" cmpd="sng" algn="ctr">
-                      <a:solidFill>
-                        <a:schemeClr val="tx1"/>
-                      </a:solidFill>
-                      <a:prstDash val="solid"/>
-                      <a:round/>
-                      <a:headEnd type="none" w="med" len="med"/>
-                      <a:tailEnd type="none" w="med" len="med"/>
-                    </a:lnB>
-                    <a:lnTlToBr w="12700" cmpd="sng">
-                      <a:noFill/>
-                      <a:prstDash val="solid"/>
-                    </a:lnTlToBr>
-                    <a:lnBlToTr w="12700" cmpd="sng">
-                      <a:noFill/>
-                      <a:prstDash val="solid"/>
-                    </a:lnBlToTr>
-                    <a:solidFill>
-                      <a:schemeClr val="tx2">
-                        <a:lumMod val="20000"/>
-                        <a:lumOff val="80000"/>
-                      </a:schemeClr>
-                    </a:solidFill>
-                  </a:tcPr>
-                </a:tc>
-                <a:tc>
-                  <a:txBody>
-                    <a:bodyPr/>
-                    <a:lstStyle/>
-                    <a:p>
-                      <a:pPr algn="ctr"/>
-                      <a:endParaRPr lang="en-US" dirty="0"/>
-                    </a:p>
-                  </a:txBody>
-                  <a:tcPr>
-                    <a:lnL w="12700" cap="flat" cmpd="sng" algn="ctr">
-                      <a:solidFill>
-                        <a:schemeClr val="tx1"/>
-                      </a:solidFill>
-                      <a:prstDash val="solid"/>
-                      <a:round/>
-                      <a:headEnd type="none" w="med" len="med"/>
-                      <a:tailEnd type="none" w="med" len="med"/>
-                    </a:lnL>
-                    <a:lnR w="12700" cap="flat" cmpd="sng" algn="ctr">
-                      <a:solidFill>
-                        <a:schemeClr val="tx1"/>
-                      </a:solidFill>
-                      <a:prstDash val="solid"/>
-                      <a:round/>
-                      <a:headEnd type="none" w="med" len="med"/>
-                      <a:tailEnd type="none" w="med" len="med"/>
-                    </a:lnR>
-                    <a:lnT w="12700" cap="flat" cmpd="sng" algn="ctr">
-                      <a:solidFill>
-                        <a:schemeClr val="tx1"/>
-                      </a:solidFill>
-                      <a:prstDash val="solid"/>
-                      <a:round/>
-                      <a:headEnd type="none" w="med" len="med"/>
-                      <a:tailEnd type="none" w="med" len="med"/>
-                    </a:lnT>
-                    <a:lnB w="12700" cap="flat" cmpd="sng" algn="ctr">
-                      <a:solidFill>
-                        <a:schemeClr val="tx1"/>
-                      </a:solidFill>
-                      <a:prstDash val="solid"/>
-                      <a:round/>
-                      <a:headEnd type="none" w="med" len="med"/>
-                      <a:tailEnd type="none" w="med" len="med"/>
-                    </a:lnB>
-                    <a:lnTlToBr w="12700" cmpd="sng">
-                      <a:noFill/>
-                      <a:prstDash val="solid"/>
-                    </a:lnTlToBr>
-                    <a:lnBlToTr w="12700" cmpd="sng">
-                      <a:noFill/>
-                      <a:prstDash val="solid"/>
-                    </a:lnBlToTr>
-                    <a:solidFill>
-                      <a:schemeClr val="tx2">
-                        <a:lumMod val="20000"/>
-                        <a:lumOff val="80000"/>
-                      </a:schemeClr>
-                    </a:solidFill>
-                  </a:tcPr>
-                </a:tc>
-                <a:tc>
-                  <a:txBody>
-                    <a:bodyPr/>
-                    <a:lstStyle/>
-                    <a:p>
-                      <a:pPr algn="ctr"/>
-                      <a:endParaRPr lang="en-US" dirty="0"/>
-                    </a:p>
-                  </a:txBody>
-                  <a:tcPr>
-                    <a:lnL w="12700" cap="flat" cmpd="sng" algn="ctr">
-                      <a:solidFill>
-                        <a:schemeClr val="tx1"/>
-                      </a:solidFill>
-                      <a:prstDash val="solid"/>
-                      <a:round/>
-                      <a:headEnd type="none" w="med" len="med"/>
-                      <a:tailEnd type="none" w="med" len="med"/>
-                    </a:lnL>
-                    <a:lnR w="12700" cap="flat" cmpd="sng" algn="ctr">
-                      <a:solidFill>
-                        <a:schemeClr val="tx1"/>
-                      </a:solidFill>
-                      <a:prstDash val="solid"/>
-                      <a:round/>
-                      <a:headEnd type="none" w="med" len="med"/>
-                      <a:tailEnd type="none" w="med" len="med"/>
-                    </a:lnR>
-                    <a:lnT w="12700" cap="flat" cmpd="sng" algn="ctr">
-                      <a:solidFill>
-                        <a:schemeClr val="tx1"/>
-                      </a:solidFill>
-                      <a:prstDash val="solid"/>
-                      <a:round/>
-                      <a:headEnd type="none" w="med" len="med"/>
-                      <a:tailEnd type="none" w="med" len="med"/>
-                    </a:lnT>
-                    <a:lnB w="12700" cap="flat" cmpd="sng" algn="ctr">
-                      <a:solidFill>
-                        <a:schemeClr val="tx1"/>
-                      </a:solidFill>
-                      <a:prstDash val="solid"/>
-                      <a:round/>
-                      <a:headEnd type="none" w="med" len="med"/>
-                      <a:tailEnd type="none" w="med" len="med"/>
-                    </a:lnB>
-                    <a:lnTlToBr w="12700" cmpd="sng">
-                      <a:noFill/>
-                      <a:prstDash val="solid"/>
-                    </a:lnTlToBr>
-                    <a:lnBlToTr w="12700" cmpd="sng">
-                      <a:noFill/>
-                      <a:prstDash val="solid"/>
-                    </a:lnBlToTr>
-                    <a:solidFill>
-                      <a:schemeClr val="tx2">
-                        <a:lumMod val="20000"/>
-                        <a:lumOff val="80000"/>
-                      </a:schemeClr>
-                    </a:solidFill>
-                  </a:tcPr>
-                </a:tc>
-                <a:tc>
-                  <a:txBody>
-                    <a:bodyPr/>
-                    <a:lstStyle/>
-                    <a:p>
-                      <a:pPr algn="ctr"/>
-                      <a:endParaRPr lang="en-US" dirty="0"/>
-                    </a:p>
-                  </a:txBody>
-                  <a:tcPr>
-                    <a:lnL w="12700" cap="flat" cmpd="sng" algn="ctr">
-                      <a:solidFill>
-                        <a:schemeClr val="tx1"/>
-                      </a:solidFill>
-                      <a:prstDash val="solid"/>
-                      <a:round/>
-                      <a:headEnd type="none" w="med" len="med"/>
-                      <a:tailEnd type="none" w="med" len="med"/>
-                    </a:lnL>
-                    <a:lnR w="12700" cap="flat" cmpd="sng" algn="ctr">
-                      <a:solidFill>
-                        <a:schemeClr val="tx1"/>
-                      </a:solidFill>
-                      <a:prstDash val="solid"/>
-                      <a:round/>
-                      <a:headEnd type="none" w="med" len="med"/>
-                      <a:tailEnd type="none" w="med" len="med"/>
-                    </a:lnR>
-                    <a:lnT w="12700" cap="flat" cmpd="sng" algn="ctr">
-                      <a:solidFill>
-                        <a:schemeClr val="tx1"/>
-                      </a:solidFill>
-                      <a:prstDash val="solid"/>
-                      <a:round/>
-                      <a:headEnd type="none" w="med" len="med"/>
-                      <a:tailEnd type="none" w="med" len="med"/>
-                    </a:lnT>
-                    <a:lnB w="12700" cap="flat" cmpd="sng" algn="ctr">
-                      <a:solidFill>
-                        <a:schemeClr val="tx1"/>
-                      </a:solidFill>
-                      <a:prstDash val="solid"/>
-                      <a:round/>
-                      <a:headEnd type="none" w="med" len="med"/>
-                      <a:tailEnd type="none" w="med" len="med"/>
-                    </a:lnB>
-                    <a:lnTlToBr w="12700" cmpd="sng">
-                      <a:noFill/>
-                      <a:prstDash val="solid"/>
-                    </a:lnTlToBr>
-                    <a:lnBlToTr w="12700" cmpd="sng">
-                      <a:noFill/>
-                      <a:prstDash val="solid"/>
-                    </a:lnBlToTr>
-                    <a:solidFill>
-                      <a:schemeClr val="tx2">
-                        <a:lumMod val="20000"/>
-                        <a:lumOff val="80000"/>
-                      </a:schemeClr>
-                    </a:solidFill>
-                  </a:tcPr>
-                </a:tc>
-                <a:tc>
-                  <a:txBody>
-                    <a:bodyPr/>
-                    <a:lstStyle/>
-                    <a:p>
-                      <a:pPr algn="ctr"/>
-                      <a:endParaRPr lang="en-US" dirty="0"/>
-                    </a:p>
-                  </a:txBody>
-                  <a:tcPr>
-                    <a:lnL w="12700" cap="flat" cmpd="sng" algn="ctr">
-                      <a:solidFill>
-                        <a:schemeClr val="tx1"/>
-                      </a:solidFill>
-                      <a:prstDash val="solid"/>
-                      <a:round/>
-                      <a:headEnd type="none" w="med" len="med"/>
-                      <a:tailEnd type="none" w="med" len="med"/>
-                    </a:lnL>
-                    <a:lnR w="12700" cap="flat" cmpd="sng" algn="ctr">
-                      <a:solidFill>
-                        <a:schemeClr val="tx1"/>
-                      </a:solidFill>
-                      <a:prstDash val="solid"/>
-                      <a:round/>
-                      <a:headEnd type="none" w="med" len="med"/>
-                      <a:tailEnd type="none" w="med" len="med"/>
-                    </a:lnR>
-                    <a:lnT w="12700" cap="flat" cmpd="sng" algn="ctr">
-                      <a:solidFill>
-                        <a:schemeClr val="tx1"/>
-                      </a:solidFill>
-                      <a:prstDash val="solid"/>
-                      <a:round/>
-                      <a:headEnd type="none" w="med" len="med"/>
-                      <a:tailEnd type="none" w="med" len="med"/>
-                    </a:lnT>
-                    <a:lnB w="12700" cap="flat" cmpd="sng" algn="ctr">
-                      <a:solidFill>
-                        <a:schemeClr val="tx1"/>
-                      </a:solidFill>
-                      <a:prstDash val="solid"/>
-                      <a:round/>
-                      <a:headEnd type="none" w="med" len="med"/>
-                      <a:tailEnd type="none" w="med" len="med"/>
-                    </a:lnB>
-                    <a:lnTlToBr w="12700" cmpd="sng">
-                      <a:noFill/>
-                      <a:prstDash val="solid"/>
-                    </a:lnTlToBr>
-                    <a:lnBlToTr w="12700" cmpd="sng">
-                      <a:noFill/>
-                      <a:prstDash val="solid"/>
-                    </a:lnBlToTr>
-                    <a:solidFill>
-                      <a:schemeClr val="tx2">
-                        <a:lumMod val="20000"/>
-                        <a:lumOff val="80000"/>
-                      </a:schemeClr>
-                    </a:solidFill>
-                  </a:tcPr>
-                </a:tc>
-              </a:tr>
-              <a:tr h="152400">
-                <a:tc>
-                  <a:txBody>
-                    <a:bodyPr/>
-                    <a:lstStyle/>
-                    <a:p>
-                      <a:pPr algn="ctr"/>
-                      <a:endParaRPr lang="en-US" dirty="0"/>
-                    </a:p>
-                  </a:txBody>
-                  <a:tcPr>
-                    <a:lnL w="12700" cap="flat" cmpd="sng" algn="ctr">
-                      <a:solidFill>
-                        <a:schemeClr val="tx1"/>
-                      </a:solidFill>
-                      <a:prstDash val="solid"/>
-                      <a:round/>
-                      <a:headEnd type="none" w="med" len="med"/>
-                      <a:tailEnd type="none" w="med" len="med"/>
-                    </a:lnL>
-                    <a:lnR w="12700" cap="flat" cmpd="sng" algn="ctr">
-                      <a:solidFill>
-                        <a:schemeClr val="tx1"/>
-                      </a:solidFill>
-                      <a:prstDash val="solid"/>
-                      <a:round/>
-                      <a:headEnd type="none" w="med" len="med"/>
-                      <a:tailEnd type="none" w="med" len="med"/>
-                    </a:lnR>
-                    <a:lnT w="12700" cap="flat" cmpd="sng" algn="ctr">
-                      <a:solidFill>
-                        <a:schemeClr val="tx1"/>
-                      </a:solidFill>
-                      <a:prstDash val="solid"/>
-                      <a:round/>
-                      <a:headEnd type="none" w="med" len="med"/>
-                      <a:tailEnd type="none" w="med" len="med"/>
-                    </a:lnT>
-                    <a:lnB w="12700" cap="flat" cmpd="sng" algn="ctr">
-                      <a:solidFill>
-                        <a:schemeClr val="tx1"/>
-                      </a:solidFill>
-                      <a:prstDash val="solid"/>
-                      <a:round/>
-                      <a:headEnd type="none" w="med" len="med"/>
-                      <a:tailEnd type="none" w="med" len="med"/>
-                    </a:lnB>
-                    <a:lnTlToBr w="12700" cmpd="sng">
-                      <a:noFill/>
-                      <a:prstDash val="solid"/>
-                    </a:lnTlToBr>
-                    <a:lnBlToTr w="12700" cmpd="sng">
-                      <a:noFill/>
-                      <a:prstDash val="solid"/>
-                    </a:lnBlToTr>
-                    <a:solidFill>
-                      <a:schemeClr val="bg1">
-                        <a:lumMod val="85000"/>
-                      </a:schemeClr>
-                    </a:solidFill>
-                  </a:tcPr>
-                </a:tc>
-                <a:tc>
-                  <a:txBody>
-                    <a:bodyPr/>
-                    <a:lstStyle/>
-                    <a:p>
-                      <a:pPr algn="ctr"/>
-                      <a:endParaRPr lang="en-US" dirty="0"/>
-                    </a:p>
-                  </a:txBody>
-                  <a:tcPr>
-                    <a:lnL w="12700" cap="flat" cmpd="sng" algn="ctr">
-                      <a:solidFill>
-                        <a:schemeClr val="tx1"/>
-                      </a:solidFill>
-                      <a:prstDash val="solid"/>
-                      <a:round/>
-                      <a:headEnd type="none" w="med" len="med"/>
-                      <a:tailEnd type="none" w="med" len="med"/>
-                    </a:lnL>
-                    <a:lnR w="12700" cap="flat" cmpd="sng" algn="ctr">
-                      <a:solidFill>
-                        <a:schemeClr val="tx1"/>
-                      </a:solidFill>
-                      <a:prstDash val="solid"/>
-                      <a:round/>
-                      <a:headEnd type="none" w="med" len="med"/>
-                      <a:tailEnd type="none" w="med" len="med"/>
-                    </a:lnR>
-                    <a:lnT w="12700" cap="flat" cmpd="sng" algn="ctr">
-                      <a:solidFill>
-                        <a:schemeClr val="tx1"/>
-                      </a:solidFill>
-                      <a:prstDash val="solid"/>
-                      <a:round/>
-                      <a:headEnd type="none" w="med" len="med"/>
-                      <a:tailEnd type="none" w="med" len="med"/>
-                    </a:lnT>
-                    <a:lnB w="12700" cap="flat" cmpd="sng" algn="ctr">
-                      <a:solidFill>
-                        <a:schemeClr val="tx1"/>
-                      </a:solidFill>
-                      <a:prstDash val="solid"/>
-                      <a:round/>
-                      <a:headEnd type="none" w="med" len="med"/>
-                      <a:tailEnd type="none" w="med" len="med"/>
-                    </a:lnB>
-                    <a:lnTlToBr w="12700" cmpd="sng">
-                      <a:noFill/>
-                      <a:prstDash val="solid"/>
-                    </a:lnTlToBr>
-                    <a:lnBlToTr w="12700" cmpd="sng">
-                      <a:noFill/>
-                      <a:prstDash val="solid"/>
-                    </a:lnBlToTr>
-                    <a:solidFill>
-                      <a:schemeClr val="bg1">
-                        <a:lumMod val="85000"/>
-                      </a:schemeClr>
-                    </a:solidFill>
-                  </a:tcPr>
-                </a:tc>
-                <a:tc>
-                  <a:txBody>
-                    <a:bodyPr/>
-                    <a:lstStyle/>
-                    <a:p>
-                      <a:pPr algn="ctr"/>
-                      <a:endParaRPr lang="en-US" dirty="0"/>
-                    </a:p>
-                  </a:txBody>
-                  <a:tcPr>
-                    <a:lnL w="12700" cap="flat" cmpd="sng" algn="ctr">
-                      <a:solidFill>
-                        <a:schemeClr val="tx1"/>
-                      </a:solidFill>
-                      <a:prstDash val="solid"/>
-                      <a:round/>
-                      <a:headEnd type="none" w="med" len="med"/>
-                      <a:tailEnd type="none" w="med" len="med"/>
-                    </a:lnL>
-                    <a:lnR w="12700" cap="flat" cmpd="sng" algn="ctr">
-                      <a:solidFill>
-                        <a:schemeClr val="tx1"/>
-                      </a:solidFill>
-                      <a:prstDash val="solid"/>
-                      <a:round/>
-                      <a:headEnd type="none" w="med" len="med"/>
-                      <a:tailEnd type="none" w="med" len="med"/>
-                    </a:lnR>
-                    <a:lnT w="12700" cap="flat" cmpd="sng" algn="ctr">
-                      <a:solidFill>
-                        <a:schemeClr val="tx1"/>
-                      </a:solidFill>
-                      <a:prstDash val="solid"/>
-                      <a:round/>
-                      <a:headEnd type="none" w="med" len="med"/>
-                      <a:tailEnd type="none" w="med" len="med"/>
-                    </a:lnT>
-                    <a:lnB w="12700" cap="flat" cmpd="sng" algn="ctr">
-                      <a:solidFill>
-                        <a:schemeClr val="tx1"/>
-                      </a:solidFill>
-                      <a:prstDash val="solid"/>
-                      <a:round/>
-                      <a:headEnd type="none" w="med" len="med"/>
-                      <a:tailEnd type="none" w="med" len="med"/>
-                    </a:lnB>
-                    <a:lnTlToBr w="12700" cmpd="sng">
-                      <a:noFill/>
-                      <a:prstDash val="solid"/>
-                    </a:lnTlToBr>
-                    <a:lnBlToTr w="12700" cmpd="sng">
-                      <a:noFill/>
-                      <a:prstDash val="solid"/>
-                    </a:lnBlToTr>
-                    <a:solidFill>
-                      <a:schemeClr val="bg1">
-                        <a:lumMod val="85000"/>
-                      </a:schemeClr>
-                    </a:solidFill>
-                  </a:tcPr>
-                </a:tc>
-                <a:tc>
-                  <a:txBody>
-                    <a:bodyPr/>
-                    <a:lstStyle/>
-                    <a:p>
-                      <a:pPr algn="ctr"/>
-                      <a:endParaRPr lang="en-US" dirty="0"/>
-                    </a:p>
-                  </a:txBody>
-                  <a:tcPr>
-                    <a:lnL w="12700" cap="flat" cmpd="sng" algn="ctr">
-                      <a:solidFill>
-                        <a:schemeClr val="tx1"/>
-                      </a:solidFill>
-                      <a:prstDash val="solid"/>
-                      <a:round/>
-                      <a:headEnd type="none" w="med" len="med"/>
-                      <a:tailEnd type="none" w="med" len="med"/>
-                    </a:lnL>
-                    <a:lnR w="12700" cap="flat" cmpd="sng" algn="ctr">
-                      <a:solidFill>
-                        <a:schemeClr val="tx1"/>
-                      </a:solidFill>
-                      <a:prstDash val="solid"/>
-                      <a:round/>
-                      <a:headEnd type="none" w="med" len="med"/>
-                      <a:tailEnd type="none" w="med" len="med"/>
-                    </a:lnR>
-                    <a:lnT w="12700" cap="flat" cmpd="sng" algn="ctr">
-                      <a:solidFill>
-                        <a:schemeClr val="tx1"/>
-                      </a:solidFill>
-                      <a:prstDash val="solid"/>
-                      <a:round/>
-                      <a:headEnd type="none" w="med" len="med"/>
-                      <a:tailEnd type="none" w="med" len="med"/>
-                    </a:lnT>
-                    <a:lnB w="12700" cap="flat" cmpd="sng" algn="ctr">
-                      <a:solidFill>
-                        <a:schemeClr val="tx1"/>
-                      </a:solidFill>
-                      <a:prstDash val="solid"/>
-                      <a:round/>
-                      <a:headEnd type="none" w="med" len="med"/>
-                      <a:tailEnd type="none" w="med" len="med"/>
-                    </a:lnB>
-                    <a:lnTlToBr w="12700" cmpd="sng">
-                      <a:noFill/>
-                      <a:prstDash val="solid"/>
-                    </a:lnTlToBr>
-                    <a:lnBlToTr w="12700" cmpd="sng">
-                      <a:noFill/>
-                      <a:prstDash val="solid"/>
-                    </a:lnBlToTr>
-                    <a:solidFill>
-                      <a:schemeClr val="bg1">
-                        <a:lumMod val="85000"/>
-                      </a:schemeClr>
-                    </a:solidFill>
-                  </a:tcPr>
-                </a:tc>
-                <a:tc>
-                  <a:txBody>
-                    <a:bodyPr/>
-                    <a:lstStyle/>
-                    <a:p>
-                      <a:pPr algn="ctr"/>
-                      <a:endParaRPr lang="en-US" dirty="0"/>
-                    </a:p>
-                  </a:txBody>
-                  <a:tcPr>
-                    <a:lnL w="12700" cap="flat" cmpd="sng" algn="ctr">
-                      <a:solidFill>
-                        <a:schemeClr val="tx1"/>
-                      </a:solidFill>
-                      <a:prstDash val="solid"/>
-                      <a:round/>
-                      <a:headEnd type="none" w="med" len="med"/>
-                      <a:tailEnd type="none" w="med" len="med"/>
-                    </a:lnL>
-                    <a:lnR w="12700" cap="flat" cmpd="sng" algn="ctr">
-                      <a:solidFill>
-                        <a:schemeClr val="tx1"/>
-                      </a:solidFill>
-                      <a:prstDash val="solid"/>
-                      <a:round/>
-                      <a:headEnd type="none" w="med" len="med"/>
-                      <a:tailEnd type="none" w="med" len="med"/>
-                    </a:lnR>
-                    <a:lnT w="12700" cap="flat" cmpd="sng" algn="ctr">
-                      <a:solidFill>
-                        <a:schemeClr val="tx1"/>
-                      </a:solidFill>
-                      <a:prstDash val="solid"/>
-                      <a:round/>
-                      <a:headEnd type="none" w="med" len="med"/>
-                      <a:tailEnd type="none" w="med" len="med"/>
-                    </a:lnT>
-                    <a:lnB w="12700" cap="flat" cmpd="sng" algn="ctr">
-                      <a:solidFill>
-                        <a:schemeClr val="tx1"/>
-                      </a:solidFill>
-                      <a:prstDash val="solid"/>
-                      <a:round/>
-                      <a:headEnd type="none" w="med" len="med"/>
-                      <a:tailEnd type="none" w="med" len="med"/>
-                    </a:lnB>
-                    <a:lnTlToBr w="12700" cmpd="sng">
-                      <a:noFill/>
-                      <a:prstDash val="solid"/>
-                    </a:lnTlToBr>
-                    <a:lnBlToTr w="12700" cmpd="sng">
-                      <a:noFill/>
-                      <a:prstDash val="solid"/>
-                    </a:lnBlToTr>
-                    <a:solidFill>
-                      <a:schemeClr val="bg1">
-                        <a:lumMod val="85000"/>
-                      </a:schemeClr>
-                    </a:solidFill>
-                  </a:tcPr>
-                </a:tc>
-                <a:tc>
-                  <a:txBody>
-                    <a:bodyPr/>
-                    <a:lstStyle/>
-                    <a:p>
-                      <a:pPr algn="ctr"/>
-                      <a:endParaRPr lang="en-US" dirty="0"/>
-                    </a:p>
-                  </a:txBody>
-                  <a:tcPr>
-                    <a:lnL w="12700" cap="flat" cmpd="sng" algn="ctr">
-                      <a:solidFill>
-                        <a:schemeClr val="tx1"/>
-                      </a:solidFill>
-                      <a:prstDash val="solid"/>
-                      <a:round/>
-                      <a:headEnd type="none" w="med" len="med"/>
-                      <a:tailEnd type="none" w="med" len="med"/>
-                    </a:lnL>
-                    <a:lnR w="12700" cap="flat" cmpd="sng" algn="ctr">
-                      <a:solidFill>
-                        <a:schemeClr val="tx1"/>
-                      </a:solidFill>
-                      <a:prstDash val="solid"/>
-                      <a:round/>
-                      <a:headEnd type="none" w="med" len="med"/>
-                      <a:tailEnd type="none" w="med" len="med"/>
-                    </a:lnR>
-                    <a:lnT w="12700" cap="flat" cmpd="sng" algn="ctr">
-                      <a:solidFill>
-                        <a:schemeClr val="tx1"/>
-                      </a:solidFill>
-                      <a:prstDash val="solid"/>
-                      <a:round/>
-                      <a:headEnd type="none" w="med" len="med"/>
-                      <a:tailEnd type="none" w="med" len="med"/>
-                    </a:lnT>
-                    <a:lnB w="12700" cap="flat" cmpd="sng" algn="ctr">
-                      <a:solidFill>
-                        <a:schemeClr val="tx1"/>
-                      </a:solidFill>
-                      <a:prstDash val="solid"/>
-                      <a:round/>
-                      <a:headEnd type="none" w="med" len="med"/>
-                      <a:tailEnd type="none" w="med" len="med"/>
-                    </a:lnB>
-                    <a:lnTlToBr w="12700" cmpd="sng">
-                      <a:noFill/>
-                      <a:prstDash val="solid"/>
-                    </a:lnTlToBr>
-                    <a:lnBlToTr w="12700" cmpd="sng">
-                      <a:noFill/>
-                      <a:prstDash val="solid"/>
-                    </a:lnBlToTr>
-                    <a:solidFill>
-                      <a:schemeClr val="bg1">
-                        <a:lumMod val="85000"/>
-                      </a:schemeClr>
-                    </a:solidFill>
-                  </a:tcPr>
-                </a:tc>
-                <a:tc>
-                  <a:txBody>
-                    <a:bodyPr/>
-                    <a:lstStyle/>
-                    <a:p>
-                      <a:pPr algn="ctr"/>
-                      <a:endParaRPr lang="en-US" dirty="0"/>
-                    </a:p>
-                  </a:txBody>
-                  <a:tcPr>
-                    <a:lnL w="12700" cap="flat" cmpd="sng" algn="ctr">
-                      <a:solidFill>
-                        <a:schemeClr val="tx1"/>
-                      </a:solidFill>
-                      <a:prstDash val="solid"/>
-                      <a:round/>
-                      <a:headEnd type="none" w="med" len="med"/>
-                      <a:tailEnd type="none" w="med" len="med"/>
-                    </a:lnL>
-                    <a:lnR w="12700" cap="flat" cmpd="sng" algn="ctr">
-                      <a:solidFill>
-                        <a:schemeClr val="tx1"/>
-                      </a:solidFill>
-                      <a:prstDash val="solid"/>
-                      <a:round/>
-                      <a:headEnd type="none" w="med" len="med"/>
-                      <a:tailEnd type="none" w="med" len="med"/>
-                    </a:lnR>
-                    <a:lnT w="12700" cap="flat" cmpd="sng" algn="ctr">
-                      <a:solidFill>
-                        <a:schemeClr val="tx1"/>
-                      </a:solidFill>
-                      <a:prstDash val="solid"/>
-                      <a:round/>
-                      <a:headEnd type="none" w="med" len="med"/>
-                      <a:tailEnd type="none" w="med" len="med"/>
-                    </a:lnT>
-                    <a:lnB w="12700" cap="flat" cmpd="sng" algn="ctr">
-                      <a:solidFill>
-                        <a:schemeClr val="tx1"/>
-                      </a:solidFill>
-                      <a:prstDash val="solid"/>
-                      <a:round/>
-                      <a:headEnd type="none" w="med" len="med"/>
-                      <a:tailEnd type="none" w="med" len="med"/>
-                    </a:lnB>
-                    <a:lnTlToBr w="12700" cmpd="sng">
-                      <a:noFill/>
-                      <a:prstDash val="solid"/>
-                    </a:lnTlToBr>
-                    <a:lnBlToTr w="12700" cmpd="sng">
-                      <a:noFill/>
-                      <a:prstDash val="solid"/>
-                    </a:lnBlToTr>
-                    <a:solidFill>
-                      <a:schemeClr val="bg1">
-                        <a:lumMod val="85000"/>
-                      </a:schemeClr>
-                    </a:solidFill>
-                  </a:tcPr>
-                </a:tc>
-                <a:tc>
-                  <a:txBody>
-                    <a:bodyPr/>
-                    <a:lstStyle/>
-                    <a:p>
-                      <a:pPr algn="ctr"/>
-                      <a:endParaRPr lang="en-US" dirty="0"/>
-                    </a:p>
-                  </a:txBody>
-                  <a:tcPr>
-                    <a:lnL w="12700" cap="flat" cmpd="sng" algn="ctr">
-                      <a:solidFill>
-                        <a:schemeClr val="tx1"/>
-                      </a:solidFill>
-                      <a:prstDash val="solid"/>
-                      <a:round/>
-                      <a:headEnd type="none" w="med" len="med"/>
-                      <a:tailEnd type="none" w="med" len="med"/>
-                    </a:lnL>
-                    <a:lnR w="12700" cap="flat" cmpd="sng" algn="ctr">
-                      <a:solidFill>
-                        <a:schemeClr val="tx1"/>
-                      </a:solidFill>
-                      <a:prstDash val="solid"/>
-                      <a:round/>
-                      <a:headEnd type="none" w="med" len="med"/>
-                      <a:tailEnd type="none" w="med" len="med"/>
-                    </a:lnR>
-                    <a:lnT w="12700" cap="flat" cmpd="sng" algn="ctr">
-                      <a:solidFill>
-                        <a:schemeClr val="tx1"/>
-                      </a:solidFill>
-                      <a:prstDash val="solid"/>
-                      <a:round/>
-                      <a:headEnd type="none" w="med" len="med"/>
-                      <a:tailEnd type="none" w="med" len="med"/>
-                    </a:lnT>
-                    <a:lnB w="12700" cap="flat" cmpd="sng" algn="ctr">
-                      <a:solidFill>
-                        <a:schemeClr val="tx1"/>
-                      </a:solidFill>
-                      <a:prstDash val="solid"/>
-                      <a:round/>
-                      <a:headEnd type="none" w="med" len="med"/>
-                      <a:tailEnd type="none" w="med" len="med"/>
-                    </a:lnB>
-                    <a:lnTlToBr w="12700" cmpd="sng">
-                      <a:noFill/>
-                      <a:prstDash val="solid"/>
-                    </a:lnTlToBr>
-                    <a:lnBlToTr w="12700" cmpd="sng">
-                      <a:noFill/>
-                      <a:prstDash val="solid"/>
-                    </a:lnBlToTr>
-                    <a:solidFill>
-                      <a:schemeClr val="bg1">
-                        <a:lumMod val="85000"/>
-                      </a:schemeClr>
-                    </a:solidFill>
-                  </a:tcPr>
-                </a:tc>
-              </a:tr>
-              <a:tr h="152400">
-                <a:tc>
-                  <a:txBody>
-                    <a:bodyPr/>
-                    <a:lstStyle/>
-                    <a:p>
-                      <a:pPr algn="ctr"/>
-                      <a:endParaRPr lang="en-US" dirty="0"/>
-                    </a:p>
-                  </a:txBody>
-                  <a:tcPr>
-                    <a:lnL w="12700" cap="flat" cmpd="sng" algn="ctr">
-                      <a:solidFill>
-                        <a:schemeClr val="tx1"/>
-                      </a:solidFill>
-                      <a:prstDash val="solid"/>
-                      <a:round/>
-                      <a:headEnd type="none" w="med" len="med"/>
-                      <a:tailEnd type="none" w="med" len="med"/>
-                    </a:lnL>
-                    <a:lnR w="12700" cap="flat" cmpd="sng" algn="ctr">
-                      <a:solidFill>
-                        <a:schemeClr val="tx1"/>
-                      </a:solidFill>
-                      <a:prstDash val="solid"/>
-                      <a:round/>
-                      <a:headEnd type="none" w="med" len="med"/>
-                      <a:tailEnd type="none" w="med" len="med"/>
-                    </a:lnR>
-                    <a:lnT w="12700" cap="flat" cmpd="sng" algn="ctr">
-                      <a:solidFill>
-                        <a:schemeClr val="tx1"/>
-                      </a:solidFill>
-                      <a:prstDash val="solid"/>
-                      <a:round/>
-                      <a:headEnd type="none" w="med" len="med"/>
-                      <a:tailEnd type="none" w="med" len="med"/>
-                    </a:lnT>
-                    <a:lnB w="12700" cap="flat" cmpd="sng" algn="ctr">
-                      <a:solidFill>
-                        <a:schemeClr val="tx1"/>
-                      </a:solidFill>
-                      <a:prstDash val="solid"/>
-                      <a:round/>
-                      <a:headEnd type="none" w="med" len="med"/>
-                      <a:tailEnd type="none" w="med" len="med"/>
-                    </a:lnB>
-                    <a:lnTlToBr w="12700" cmpd="sng">
-                      <a:noFill/>
-                      <a:prstDash val="solid"/>
-                    </a:lnTlToBr>
-                    <a:lnBlToTr w="12700" cmpd="sng">
-                      <a:noFill/>
-                      <a:prstDash val="solid"/>
-                    </a:lnBlToTr>
-                    <a:solidFill>
-                      <a:schemeClr val="tx2">
-                        <a:lumMod val="20000"/>
-                        <a:lumOff val="80000"/>
-                      </a:schemeClr>
-                    </a:solidFill>
-                  </a:tcPr>
-                </a:tc>
-                <a:tc>
-                  <a:txBody>
-                    <a:bodyPr/>
-                    <a:lstStyle/>
-                    <a:p>
-                      <a:pPr algn="ctr"/>
-                      <a:endParaRPr lang="en-US"/>
-                    </a:p>
-                  </a:txBody>
-                  <a:tcPr>
-                    <a:lnL w="12700" cap="flat" cmpd="sng" algn="ctr">
-                      <a:solidFill>
-                        <a:schemeClr val="tx1"/>
-                      </a:solidFill>
-                      <a:prstDash val="solid"/>
-                      <a:round/>
-                      <a:headEnd type="none" w="med" len="med"/>
-                      <a:tailEnd type="none" w="med" len="med"/>
-                    </a:lnL>
-                    <a:lnR w="12700" cap="flat" cmpd="sng" algn="ctr">
-                      <a:solidFill>
-                        <a:schemeClr val="tx1"/>
-                      </a:solidFill>
-                      <a:prstDash val="solid"/>
-                      <a:round/>
-                      <a:headEnd type="none" w="med" len="med"/>
-                      <a:tailEnd type="none" w="med" len="med"/>
-                    </a:lnR>
-                    <a:lnT w="12700" cap="flat" cmpd="sng" algn="ctr">
-                      <a:solidFill>
-                        <a:schemeClr val="tx1"/>
-                      </a:solidFill>
-                      <a:prstDash val="solid"/>
-                      <a:round/>
-                      <a:headEnd type="none" w="med" len="med"/>
-                      <a:tailEnd type="none" w="med" len="med"/>
-                    </a:lnT>
-                    <a:lnB w="12700" cap="flat" cmpd="sng" algn="ctr">
-                      <a:solidFill>
-                        <a:schemeClr val="tx1"/>
-                      </a:solidFill>
-                      <a:prstDash val="solid"/>
-                      <a:round/>
-                      <a:headEnd type="none" w="med" len="med"/>
-                      <a:tailEnd type="none" w="med" len="med"/>
-                    </a:lnB>
-                    <a:lnTlToBr w="12700" cmpd="sng">
-                      <a:noFill/>
-                      <a:prstDash val="solid"/>
-                    </a:lnTlToBr>
-                    <a:lnBlToTr w="12700" cmpd="sng">
-                      <a:noFill/>
-                      <a:prstDash val="solid"/>
-                    </a:lnBlToTr>
-                    <a:solidFill>
-                      <a:schemeClr val="tx2">
-                        <a:lumMod val="20000"/>
-                        <a:lumOff val="80000"/>
-                      </a:schemeClr>
-                    </a:solidFill>
-                  </a:tcPr>
-                </a:tc>
-                <a:tc>
-                  <a:txBody>
-                    <a:bodyPr/>
-                    <a:lstStyle/>
-                    <a:p>
-                      <a:pPr algn="ctr"/>
-                      <a:endParaRPr lang="en-US" dirty="0"/>
-                    </a:p>
-                  </a:txBody>
-                  <a:tcPr>
-                    <a:lnL w="12700" cap="flat" cmpd="sng" algn="ctr">
-                      <a:solidFill>
-                        <a:schemeClr val="tx1"/>
-                      </a:solidFill>
-                      <a:prstDash val="solid"/>
-                      <a:round/>
-                      <a:headEnd type="none" w="med" len="med"/>
-                      <a:tailEnd type="none" w="med" len="med"/>
-                    </a:lnL>
-                    <a:lnR w="12700" cap="flat" cmpd="sng" algn="ctr">
-                      <a:solidFill>
-                        <a:schemeClr val="tx1"/>
-                      </a:solidFill>
-                      <a:prstDash val="solid"/>
-                      <a:round/>
-                      <a:headEnd type="none" w="med" len="med"/>
-                      <a:tailEnd type="none" w="med" len="med"/>
-                    </a:lnR>
-                    <a:lnT w="12700" cap="flat" cmpd="sng" algn="ctr">
-                      <a:solidFill>
-                        <a:schemeClr val="tx1"/>
-                      </a:solidFill>
-                      <a:prstDash val="solid"/>
-                      <a:round/>
-                      <a:headEnd type="none" w="med" len="med"/>
-                      <a:tailEnd type="none" w="med" len="med"/>
-                    </a:lnT>
-                    <a:lnB w="12700" cap="flat" cmpd="sng" algn="ctr">
-                      <a:solidFill>
-                        <a:schemeClr val="tx1"/>
-                      </a:solidFill>
-                      <a:prstDash val="solid"/>
-                      <a:round/>
-                      <a:headEnd type="none" w="med" len="med"/>
-                      <a:tailEnd type="none" w="med" len="med"/>
-                    </a:lnB>
-                    <a:lnTlToBr w="12700" cmpd="sng">
-                      <a:noFill/>
-                      <a:prstDash val="solid"/>
-                    </a:lnTlToBr>
-                    <a:lnBlToTr w="12700" cmpd="sng">
-                      <a:noFill/>
-                      <a:prstDash val="solid"/>
-                    </a:lnBlToTr>
-                    <a:solidFill>
-                      <a:schemeClr val="tx2">
-                        <a:lumMod val="20000"/>
-                        <a:lumOff val="80000"/>
-                      </a:schemeClr>
-                    </a:solidFill>
-                  </a:tcPr>
-                </a:tc>
-                <a:tc>
-                  <a:txBody>
-                    <a:bodyPr/>
-                    <a:lstStyle/>
-                    <a:p>
-                      <a:pPr algn="ctr"/>
-                      <a:endParaRPr lang="en-US"/>
-                    </a:p>
-                  </a:txBody>
-                  <a:tcPr>
-                    <a:lnL w="12700" cap="flat" cmpd="sng" algn="ctr">
-                      <a:solidFill>
-                        <a:schemeClr val="tx1"/>
-                      </a:solidFill>
-                      <a:prstDash val="solid"/>
-                      <a:round/>
-                      <a:headEnd type="none" w="med" len="med"/>
-                      <a:tailEnd type="none" w="med" len="med"/>
-                    </a:lnL>
-                    <a:lnR w="12700" cap="flat" cmpd="sng" algn="ctr">
-                      <a:solidFill>
-                        <a:schemeClr val="tx1"/>
-                      </a:solidFill>
-                      <a:prstDash val="solid"/>
-                      <a:round/>
-                      <a:headEnd type="none" w="med" len="med"/>
-                      <a:tailEnd type="none" w="med" len="med"/>
-                    </a:lnR>
-                    <a:lnT w="12700" cap="flat" cmpd="sng" algn="ctr">
-                      <a:solidFill>
-                        <a:schemeClr val="tx1"/>
-                      </a:solidFill>
-                      <a:prstDash val="solid"/>
-                      <a:round/>
-                      <a:headEnd type="none" w="med" len="med"/>
-                      <a:tailEnd type="none" w="med" len="med"/>
-                    </a:lnT>
-                    <a:lnB w="12700" cap="flat" cmpd="sng" algn="ctr">
-                      <a:solidFill>
-                        <a:schemeClr val="tx1"/>
-                      </a:solidFill>
-                      <a:prstDash val="solid"/>
-                      <a:round/>
-                      <a:headEnd type="none" w="med" len="med"/>
-                      <a:tailEnd type="none" w="med" len="med"/>
-                    </a:lnB>
-                    <a:lnTlToBr w="12700" cmpd="sng">
-                      <a:noFill/>
-                      <a:prstDash val="solid"/>
-                    </a:lnTlToBr>
-                    <a:lnBlToTr w="12700" cmpd="sng">
-                      <a:noFill/>
-                      <a:prstDash val="solid"/>
-                    </a:lnBlToTr>
-                    <a:solidFill>
-                      <a:schemeClr val="tx2">
-                        <a:lumMod val="20000"/>
-                        <a:lumOff val="80000"/>
-                      </a:schemeClr>
-                    </a:solidFill>
-                  </a:tcPr>
-                </a:tc>
-                <a:tc>
-                  <a:txBody>
-                    <a:bodyPr/>
-                    <a:lstStyle/>
-                    <a:p>
-                      <a:pPr algn="ctr"/>
-                      <a:endParaRPr lang="en-US" dirty="0"/>
-                    </a:p>
-                  </a:txBody>
-                  <a:tcPr>
-                    <a:lnL w="12700" cap="flat" cmpd="sng" algn="ctr">
-                      <a:solidFill>
-                        <a:schemeClr val="tx1"/>
-                      </a:solidFill>
-                      <a:prstDash val="solid"/>
-                      <a:round/>
-                      <a:headEnd type="none" w="med" len="med"/>
-                      <a:tailEnd type="none" w="med" len="med"/>
-                    </a:lnL>
-                    <a:lnR w="12700" cap="flat" cmpd="sng" algn="ctr">
-                      <a:solidFill>
-                        <a:schemeClr val="tx1"/>
-                      </a:solidFill>
-                      <a:prstDash val="solid"/>
-                      <a:round/>
-                      <a:headEnd type="none" w="med" len="med"/>
-                      <a:tailEnd type="none" w="med" len="med"/>
-                    </a:lnR>
-                    <a:lnT w="12700" cap="flat" cmpd="sng" algn="ctr">
-                      <a:solidFill>
-                        <a:schemeClr val="tx1"/>
-                      </a:solidFill>
-                      <a:prstDash val="solid"/>
-                      <a:round/>
-                      <a:headEnd type="none" w="med" len="med"/>
-                      <a:tailEnd type="none" w="med" len="med"/>
-                    </a:lnT>
-                    <a:lnB w="12700" cap="flat" cmpd="sng" algn="ctr">
-                      <a:solidFill>
-                        <a:schemeClr val="tx1"/>
-                      </a:solidFill>
-                      <a:prstDash val="solid"/>
-                      <a:round/>
-                      <a:headEnd type="none" w="med" len="med"/>
-                      <a:tailEnd type="none" w="med" len="med"/>
-                    </a:lnB>
-                    <a:lnTlToBr w="12700" cmpd="sng">
-                      <a:noFill/>
-                      <a:prstDash val="solid"/>
-                    </a:lnTlToBr>
-                    <a:lnBlToTr w="12700" cmpd="sng">
-                      <a:noFill/>
-                      <a:prstDash val="solid"/>
-                    </a:lnBlToTr>
-                    <a:solidFill>
-                      <a:schemeClr val="tx2">
-                        <a:lumMod val="20000"/>
-                        <a:lumOff val="80000"/>
-                      </a:schemeClr>
-                    </a:solidFill>
-                  </a:tcPr>
-                </a:tc>
-                <a:tc>
-                  <a:txBody>
-                    <a:bodyPr/>
-                    <a:lstStyle/>
-                    <a:p>
-                      <a:pPr algn="ctr"/>
-                      <a:endParaRPr lang="en-US" dirty="0"/>
-                    </a:p>
-                  </a:txBody>
-                  <a:tcPr>
-                    <a:lnL w="12700" cap="flat" cmpd="sng" algn="ctr">
-                      <a:solidFill>
-                        <a:schemeClr val="tx1"/>
-                      </a:solidFill>
-                      <a:prstDash val="solid"/>
-                      <a:round/>
-                      <a:headEnd type="none" w="med" len="med"/>
-                      <a:tailEnd type="none" w="med" len="med"/>
-                    </a:lnL>
-                    <a:lnR w="12700" cap="flat" cmpd="sng" algn="ctr">
-                      <a:solidFill>
-                        <a:schemeClr val="tx1"/>
-                      </a:solidFill>
-                      <a:prstDash val="solid"/>
-                      <a:round/>
-                      <a:headEnd type="none" w="med" len="med"/>
-                      <a:tailEnd type="none" w="med" len="med"/>
-                    </a:lnR>
-                    <a:lnT w="12700" cap="flat" cmpd="sng" algn="ctr">
-                      <a:solidFill>
-                        <a:schemeClr val="tx1"/>
-                      </a:solidFill>
-                      <a:prstDash val="solid"/>
-                      <a:round/>
-                      <a:headEnd type="none" w="med" len="med"/>
-                      <a:tailEnd type="none" w="med" len="med"/>
-                    </a:lnT>
-                    <a:lnB w="12700" cap="flat" cmpd="sng" algn="ctr">
-                      <a:solidFill>
-                        <a:schemeClr val="tx1"/>
-                      </a:solidFill>
-                      <a:prstDash val="solid"/>
-                      <a:round/>
-                      <a:headEnd type="none" w="med" len="med"/>
-                      <a:tailEnd type="none" w="med" len="med"/>
-                    </a:lnB>
-                    <a:lnTlToBr w="12700" cmpd="sng">
-                      <a:noFill/>
-                      <a:prstDash val="solid"/>
-                    </a:lnTlToBr>
-                    <a:lnBlToTr w="12700" cmpd="sng">
-                      <a:noFill/>
-                      <a:prstDash val="solid"/>
-                    </a:lnBlToTr>
-                    <a:solidFill>
-                      <a:schemeClr val="tx2">
-                        <a:lumMod val="20000"/>
-                        <a:lumOff val="80000"/>
-                      </a:schemeClr>
-                    </a:solidFill>
-                  </a:tcPr>
-                </a:tc>
-                <a:tc>
-                  <a:txBody>
-                    <a:bodyPr/>
-                    <a:lstStyle/>
-                    <a:p>
-                      <a:pPr algn="ctr"/>
-                      <a:endParaRPr lang="en-US" dirty="0"/>
-                    </a:p>
-                  </a:txBody>
-                  <a:tcPr>
-                    <a:lnL w="12700" cap="flat" cmpd="sng" algn="ctr">
-                      <a:solidFill>
-                        <a:schemeClr val="tx1"/>
-                      </a:solidFill>
-                      <a:prstDash val="solid"/>
-                      <a:round/>
-                      <a:headEnd type="none" w="med" len="med"/>
-                      <a:tailEnd type="none" w="med" len="med"/>
-                    </a:lnL>
-                    <a:lnR w="12700" cap="flat" cmpd="sng" algn="ctr">
-                      <a:solidFill>
-                        <a:schemeClr val="tx1"/>
-                      </a:solidFill>
-                      <a:prstDash val="solid"/>
-                      <a:round/>
-                      <a:headEnd type="none" w="med" len="med"/>
-                      <a:tailEnd type="none" w="med" len="med"/>
-                    </a:lnR>
-                    <a:lnT w="12700" cap="flat" cmpd="sng" algn="ctr">
-                      <a:solidFill>
-                        <a:schemeClr val="tx1"/>
-                      </a:solidFill>
-                      <a:prstDash val="solid"/>
-                      <a:round/>
-                      <a:headEnd type="none" w="med" len="med"/>
-                      <a:tailEnd type="none" w="med" len="med"/>
-                    </a:lnT>
-                    <a:lnB w="12700" cap="flat" cmpd="sng" algn="ctr">
-                      <a:solidFill>
-                        <a:schemeClr val="tx1"/>
-                      </a:solidFill>
-                      <a:prstDash val="solid"/>
-                      <a:round/>
-                      <a:headEnd type="none" w="med" len="med"/>
-                      <a:tailEnd type="none" w="med" len="med"/>
-                    </a:lnB>
-                    <a:lnTlToBr w="12700" cmpd="sng">
-                      <a:noFill/>
-                      <a:prstDash val="solid"/>
-                    </a:lnTlToBr>
-                    <a:lnBlToTr w="12700" cmpd="sng">
-                      <a:noFill/>
-                      <a:prstDash val="solid"/>
-                    </a:lnBlToTr>
-                    <a:solidFill>
-                      <a:schemeClr val="tx2">
-                        <a:lumMod val="20000"/>
-                        <a:lumOff val="80000"/>
-                      </a:schemeClr>
-                    </a:solidFill>
-                  </a:tcPr>
-                </a:tc>
-                <a:tc>
-                  <a:txBody>
-                    <a:bodyPr/>
-                    <a:lstStyle/>
-                    <a:p>
-                      <a:pPr algn="ctr"/>
-                      <a:endParaRPr lang="en-US" dirty="0"/>
+                      <a:endParaRPr lang="en-US" sz="1400" dirty="0"/>
                     </a:p>
                   </a:txBody>
                   <a:tcPr>
@@ -5178,1022 +3792,21 @@
           <p:nvPr/>
         </p:nvGraphicFramePr>
         <p:xfrm>
-          <a:off x="1143000" y="1524000"/>
-          <a:ext cx="1905000" cy="1463040"/>
+          <a:off x="1143000" y="2301240"/>
+          <a:ext cx="1905000" cy="304800"/>
         </p:xfrm>
         <a:graphic>
           <a:graphicData uri="http://schemas.openxmlformats.org/drawingml/2006/table">
             <a:tbl>
               <a:tblPr firstRow="1" bandRow="1">
-                <a:tableStyleId>{D113A9D2-9D6B-4929-AA2D-F23B5EE8CBE7}</a:tableStyleId>
+                <a:tableStyleId>{5940675A-B579-460E-94D1-54222C63F5DA}</a:tableStyleId>
               </a:tblPr>
               <a:tblGrid>
                 <a:gridCol w="238125"/>
                 <a:gridCol w="238125"/>
-                <a:gridCol w="238125"/>
-                <a:gridCol w="238125"/>
-                <a:gridCol w="238125"/>
-                <a:gridCol w="238125"/>
-                <a:gridCol w="238125"/>
-                <a:gridCol w="238125"/>
+                <a:gridCol w="1428750"/>
               </a:tblGrid>
-              <a:tr h="209550">
-                <a:tc>
-                  <a:txBody>
-                    <a:bodyPr/>
-                    <a:lstStyle/>
-                    <a:p>
-                      <a:pPr algn="ctr"/>
-                      <a:endParaRPr lang="en-US" dirty="0"/>
-                    </a:p>
-                  </a:txBody>
-                  <a:tcPr>
-                    <a:lnL w="12700" cap="flat" cmpd="sng" algn="ctr">
-                      <a:solidFill>
-                        <a:schemeClr val="tx1"/>
-                      </a:solidFill>
-                      <a:prstDash val="solid"/>
-                      <a:round/>
-                      <a:headEnd type="none" w="med" len="med"/>
-                      <a:tailEnd type="none" w="med" len="med"/>
-                    </a:lnL>
-                    <a:lnR w="12700" cap="flat" cmpd="sng" algn="ctr">
-                      <a:solidFill>
-                        <a:schemeClr val="tx1"/>
-                      </a:solidFill>
-                      <a:prstDash val="solid"/>
-                      <a:round/>
-                      <a:headEnd type="none" w="med" len="med"/>
-                      <a:tailEnd type="none" w="med" len="med"/>
-                    </a:lnR>
-                    <a:lnT w="12700" cap="flat" cmpd="sng" algn="ctr">
-                      <a:solidFill>
-                        <a:schemeClr val="tx1"/>
-                      </a:solidFill>
-                      <a:prstDash val="solid"/>
-                      <a:round/>
-                      <a:headEnd type="none" w="med" len="med"/>
-                      <a:tailEnd type="none" w="med" len="med"/>
-                    </a:lnT>
-                    <a:lnB w="12700" cap="flat" cmpd="sng" algn="ctr">
-                      <a:solidFill>
-                        <a:schemeClr val="tx1"/>
-                      </a:solidFill>
-                      <a:prstDash val="solid"/>
-                      <a:round/>
-                      <a:headEnd type="none" w="med" len="med"/>
-                      <a:tailEnd type="none" w="med" len="med"/>
-                    </a:lnB>
-                    <a:lnTlToBr w="12700" cmpd="sng">
-                      <a:noFill/>
-                      <a:prstDash val="solid"/>
-                    </a:lnTlToBr>
-                    <a:lnBlToTr w="12700" cmpd="sng">
-                      <a:noFill/>
-                      <a:prstDash val="solid"/>
-                    </a:lnBlToTr>
-                    <a:solidFill>
-                      <a:schemeClr val="tx2">
-                        <a:lumMod val="20000"/>
-                        <a:lumOff val="80000"/>
-                      </a:schemeClr>
-                    </a:solidFill>
-                  </a:tcPr>
-                </a:tc>
-                <a:tc>
-                  <a:txBody>
-                    <a:bodyPr/>
-                    <a:lstStyle/>
-                    <a:p>
-                      <a:pPr algn="ctr"/>
-                      <a:endParaRPr lang="en-US" dirty="0"/>
-                    </a:p>
-                  </a:txBody>
-                  <a:tcPr>
-                    <a:lnL w="12700" cap="flat" cmpd="sng" algn="ctr">
-                      <a:solidFill>
-                        <a:schemeClr val="tx1"/>
-                      </a:solidFill>
-                      <a:prstDash val="solid"/>
-                      <a:round/>
-                      <a:headEnd type="none" w="med" len="med"/>
-                      <a:tailEnd type="none" w="med" len="med"/>
-                    </a:lnL>
-                    <a:lnR w="12700" cap="flat" cmpd="sng" algn="ctr">
-                      <a:solidFill>
-                        <a:schemeClr val="tx1"/>
-                      </a:solidFill>
-                      <a:prstDash val="solid"/>
-                      <a:round/>
-                      <a:headEnd type="none" w="med" len="med"/>
-                      <a:tailEnd type="none" w="med" len="med"/>
-                    </a:lnR>
-                    <a:lnT w="12700" cap="flat" cmpd="sng" algn="ctr">
-                      <a:solidFill>
-                        <a:schemeClr val="tx1"/>
-                      </a:solidFill>
-                      <a:prstDash val="solid"/>
-                      <a:round/>
-                      <a:headEnd type="none" w="med" len="med"/>
-                      <a:tailEnd type="none" w="med" len="med"/>
-                    </a:lnT>
-                    <a:lnB w="12700" cap="flat" cmpd="sng" algn="ctr">
-                      <a:solidFill>
-                        <a:schemeClr val="tx1"/>
-                      </a:solidFill>
-                      <a:prstDash val="solid"/>
-                      <a:round/>
-                      <a:headEnd type="none" w="med" len="med"/>
-                      <a:tailEnd type="none" w="med" len="med"/>
-                    </a:lnB>
-                    <a:lnTlToBr w="12700" cmpd="sng">
-                      <a:noFill/>
-                      <a:prstDash val="solid"/>
-                    </a:lnTlToBr>
-                    <a:lnBlToTr w="12700" cmpd="sng">
-                      <a:noFill/>
-                      <a:prstDash val="solid"/>
-                    </a:lnBlToTr>
-                    <a:solidFill>
-                      <a:schemeClr val="tx2">
-                        <a:lumMod val="20000"/>
-                        <a:lumOff val="80000"/>
-                      </a:schemeClr>
-                    </a:solidFill>
-                  </a:tcPr>
-                </a:tc>
-                <a:tc>
-                  <a:txBody>
-                    <a:bodyPr/>
-                    <a:lstStyle/>
-                    <a:p>
-                      <a:pPr algn="ctr"/>
-                      <a:endParaRPr lang="en-US" dirty="0"/>
-                    </a:p>
-                  </a:txBody>
-                  <a:tcPr>
-                    <a:lnL w="12700" cap="flat" cmpd="sng" algn="ctr">
-                      <a:solidFill>
-                        <a:schemeClr val="tx1"/>
-                      </a:solidFill>
-                      <a:prstDash val="solid"/>
-                      <a:round/>
-                      <a:headEnd type="none" w="med" len="med"/>
-                      <a:tailEnd type="none" w="med" len="med"/>
-                    </a:lnL>
-                    <a:lnR w="12700" cap="flat" cmpd="sng" algn="ctr">
-                      <a:solidFill>
-                        <a:schemeClr val="tx1"/>
-                      </a:solidFill>
-                      <a:prstDash val="solid"/>
-                      <a:round/>
-                      <a:headEnd type="none" w="med" len="med"/>
-                      <a:tailEnd type="none" w="med" len="med"/>
-                    </a:lnR>
-                    <a:lnT w="12700" cap="flat" cmpd="sng" algn="ctr">
-                      <a:solidFill>
-                        <a:schemeClr val="tx1"/>
-                      </a:solidFill>
-                      <a:prstDash val="solid"/>
-                      <a:round/>
-                      <a:headEnd type="none" w="med" len="med"/>
-                      <a:tailEnd type="none" w="med" len="med"/>
-                    </a:lnT>
-                    <a:lnB w="12700" cap="flat" cmpd="sng" algn="ctr">
-                      <a:solidFill>
-                        <a:schemeClr val="tx1"/>
-                      </a:solidFill>
-                      <a:prstDash val="solid"/>
-                      <a:round/>
-                      <a:headEnd type="none" w="med" len="med"/>
-                      <a:tailEnd type="none" w="med" len="med"/>
-                    </a:lnB>
-                    <a:lnTlToBr w="12700" cmpd="sng">
-                      <a:noFill/>
-                      <a:prstDash val="solid"/>
-                    </a:lnTlToBr>
-                    <a:lnBlToTr w="12700" cmpd="sng">
-                      <a:noFill/>
-                      <a:prstDash val="solid"/>
-                    </a:lnBlToTr>
-                    <a:solidFill>
-                      <a:schemeClr val="tx2">
-                        <a:lumMod val="20000"/>
-                        <a:lumOff val="80000"/>
-                      </a:schemeClr>
-                    </a:solidFill>
-                  </a:tcPr>
-                </a:tc>
-                <a:tc>
-                  <a:txBody>
-                    <a:bodyPr/>
-                    <a:lstStyle/>
-                    <a:p>
-                      <a:pPr algn="ctr"/>
-                      <a:endParaRPr lang="en-US" dirty="0"/>
-                    </a:p>
-                  </a:txBody>
-                  <a:tcPr>
-                    <a:lnL w="12700" cap="flat" cmpd="sng" algn="ctr">
-                      <a:solidFill>
-                        <a:schemeClr val="tx1"/>
-                      </a:solidFill>
-                      <a:prstDash val="solid"/>
-                      <a:round/>
-                      <a:headEnd type="none" w="med" len="med"/>
-                      <a:tailEnd type="none" w="med" len="med"/>
-                    </a:lnL>
-                    <a:lnR w="12700" cap="flat" cmpd="sng" algn="ctr">
-                      <a:solidFill>
-                        <a:schemeClr val="tx1"/>
-                      </a:solidFill>
-                      <a:prstDash val="solid"/>
-                      <a:round/>
-                      <a:headEnd type="none" w="med" len="med"/>
-                      <a:tailEnd type="none" w="med" len="med"/>
-                    </a:lnR>
-                    <a:lnT w="12700" cap="flat" cmpd="sng" algn="ctr">
-                      <a:solidFill>
-                        <a:schemeClr val="tx1"/>
-                      </a:solidFill>
-                      <a:prstDash val="solid"/>
-                      <a:round/>
-                      <a:headEnd type="none" w="med" len="med"/>
-                      <a:tailEnd type="none" w="med" len="med"/>
-                    </a:lnT>
-                    <a:lnB w="12700" cap="flat" cmpd="sng" algn="ctr">
-                      <a:solidFill>
-                        <a:schemeClr val="tx1"/>
-                      </a:solidFill>
-                      <a:prstDash val="solid"/>
-                      <a:round/>
-                      <a:headEnd type="none" w="med" len="med"/>
-                      <a:tailEnd type="none" w="med" len="med"/>
-                    </a:lnB>
-                    <a:lnTlToBr w="12700" cmpd="sng">
-                      <a:noFill/>
-                      <a:prstDash val="solid"/>
-                    </a:lnTlToBr>
-                    <a:lnBlToTr w="12700" cmpd="sng">
-                      <a:noFill/>
-                      <a:prstDash val="solid"/>
-                    </a:lnBlToTr>
-                    <a:solidFill>
-                      <a:schemeClr val="tx2">
-                        <a:lumMod val="20000"/>
-                        <a:lumOff val="80000"/>
-                      </a:schemeClr>
-                    </a:solidFill>
-                  </a:tcPr>
-                </a:tc>
-                <a:tc>
-                  <a:txBody>
-                    <a:bodyPr/>
-                    <a:lstStyle/>
-                    <a:p>
-                      <a:pPr algn="ctr"/>
-                      <a:endParaRPr lang="en-US"/>
-                    </a:p>
-                  </a:txBody>
-                  <a:tcPr>
-                    <a:lnL w="12700" cap="flat" cmpd="sng" algn="ctr">
-                      <a:solidFill>
-                        <a:schemeClr val="tx1"/>
-                      </a:solidFill>
-                      <a:prstDash val="solid"/>
-                      <a:round/>
-                      <a:headEnd type="none" w="med" len="med"/>
-                      <a:tailEnd type="none" w="med" len="med"/>
-                    </a:lnL>
-                    <a:lnR w="12700" cap="flat" cmpd="sng" algn="ctr">
-                      <a:solidFill>
-                        <a:schemeClr val="tx1"/>
-                      </a:solidFill>
-                      <a:prstDash val="solid"/>
-                      <a:round/>
-                      <a:headEnd type="none" w="med" len="med"/>
-                      <a:tailEnd type="none" w="med" len="med"/>
-                    </a:lnR>
-                    <a:lnT w="12700" cap="flat" cmpd="sng" algn="ctr">
-                      <a:solidFill>
-                        <a:schemeClr val="tx1"/>
-                      </a:solidFill>
-                      <a:prstDash val="solid"/>
-                      <a:round/>
-                      <a:headEnd type="none" w="med" len="med"/>
-                      <a:tailEnd type="none" w="med" len="med"/>
-                    </a:lnT>
-                    <a:lnB w="12700" cap="flat" cmpd="sng" algn="ctr">
-                      <a:solidFill>
-                        <a:schemeClr val="tx1"/>
-                      </a:solidFill>
-                      <a:prstDash val="solid"/>
-                      <a:round/>
-                      <a:headEnd type="none" w="med" len="med"/>
-                      <a:tailEnd type="none" w="med" len="med"/>
-                    </a:lnB>
-                    <a:lnTlToBr w="12700" cmpd="sng">
-                      <a:noFill/>
-                      <a:prstDash val="solid"/>
-                    </a:lnTlToBr>
-                    <a:lnBlToTr w="12700" cmpd="sng">
-                      <a:noFill/>
-                      <a:prstDash val="solid"/>
-                    </a:lnBlToTr>
-                    <a:solidFill>
-                      <a:schemeClr val="tx2">
-                        <a:lumMod val="20000"/>
-                        <a:lumOff val="80000"/>
-                      </a:schemeClr>
-                    </a:solidFill>
-                  </a:tcPr>
-                </a:tc>
-                <a:tc>
-                  <a:txBody>
-                    <a:bodyPr/>
-                    <a:lstStyle/>
-                    <a:p>
-                      <a:pPr algn="ctr"/>
-                      <a:endParaRPr lang="en-US"/>
-                    </a:p>
-                  </a:txBody>
-                  <a:tcPr>
-                    <a:lnL w="12700" cap="flat" cmpd="sng" algn="ctr">
-                      <a:solidFill>
-                        <a:schemeClr val="tx1"/>
-                      </a:solidFill>
-                      <a:prstDash val="solid"/>
-                      <a:round/>
-                      <a:headEnd type="none" w="med" len="med"/>
-                      <a:tailEnd type="none" w="med" len="med"/>
-                    </a:lnL>
-                    <a:lnR w="12700" cap="flat" cmpd="sng" algn="ctr">
-                      <a:solidFill>
-                        <a:schemeClr val="tx1"/>
-                      </a:solidFill>
-                      <a:prstDash val="solid"/>
-                      <a:round/>
-                      <a:headEnd type="none" w="med" len="med"/>
-                      <a:tailEnd type="none" w="med" len="med"/>
-                    </a:lnR>
-                    <a:lnT w="12700" cap="flat" cmpd="sng" algn="ctr">
-                      <a:solidFill>
-                        <a:schemeClr val="tx1"/>
-                      </a:solidFill>
-                      <a:prstDash val="solid"/>
-                      <a:round/>
-                      <a:headEnd type="none" w="med" len="med"/>
-                      <a:tailEnd type="none" w="med" len="med"/>
-                    </a:lnT>
-                    <a:lnB w="12700" cap="flat" cmpd="sng" algn="ctr">
-                      <a:solidFill>
-                        <a:schemeClr val="tx1"/>
-                      </a:solidFill>
-                      <a:prstDash val="solid"/>
-                      <a:round/>
-                      <a:headEnd type="none" w="med" len="med"/>
-                      <a:tailEnd type="none" w="med" len="med"/>
-                    </a:lnB>
-                    <a:lnTlToBr w="12700" cmpd="sng">
-                      <a:noFill/>
-                      <a:prstDash val="solid"/>
-                    </a:lnTlToBr>
-                    <a:lnBlToTr w="12700" cmpd="sng">
-                      <a:noFill/>
-                      <a:prstDash val="solid"/>
-                    </a:lnBlToTr>
-                    <a:solidFill>
-                      <a:schemeClr val="tx2">
-                        <a:lumMod val="20000"/>
-                        <a:lumOff val="80000"/>
-                      </a:schemeClr>
-                    </a:solidFill>
-                  </a:tcPr>
-                </a:tc>
-                <a:tc>
-                  <a:txBody>
-                    <a:bodyPr/>
-                    <a:lstStyle/>
-                    <a:p>
-                      <a:pPr algn="ctr"/>
-                      <a:endParaRPr lang="en-US"/>
-                    </a:p>
-                  </a:txBody>
-                  <a:tcPr>
-                    <a:lnL w="12700" cap="flat" cmpd="sng" algn="ctr">
-                      <a:solidFill>
-                        <a:schemeClr val="tx1"/>
-                      </a:solidFill>
-                      <a:prstDash val="solid"/>
-                      <a:round/>
-                      <a:headEnd type="none" w="med" len="med"/>
-                      <a:tailEnd type="none" w="med" len="med"/>
-                    </a:lnL>
-                    <a:lnR w="12700" cap="flat" cmpd="sng" algn="ctr">
-                      <a:solidFill>
-                        <a:schemeClr val="tx1"/>
-                      </a:solidFill>
-                      <a:prstDash val="solid"/>
-                      <a:round/>
-                      <a:headEnd type="none" w="med" len="med"/>
-                      <a:tailEnd type="none" w="med" len="med"/>
-                    </a:lnR>
-                    <a:lnT w="12700" cap="flat" cmpd="sng" algn="ctr">
-                      <a:solidFill>
-                        <a:schemeClr val="tx1"/>
-                      </a:solidFill>
-                      <a:prstDash val="solid"/>
-                      <a:round/>
-                      <a:headEnd type="none" w="med" len="med"/>
-                      <a:tailEnd type="none" w="med" len="med"/>
-                    </a:lnT>
-                    <a:lnB w="12700" cap="flat" cmpd="sng" algn="ctr">
-                      <a:solidFill>
-                        <a:schemeClr val="tx1"/>
-                      </a:solidFill>
-                      <a:prstDash val="solid"/>
-                      <a:round/>
-                      <a:headEnd type="none" w="med" len="med"/>
-                      <a:tailEnd type="none" w="med" len="med"/>
-                    </a:lnB>
-                    <a:lnTlToBr w="12700" cmpd="sng">
-                      <a:noFill/>
-                      <a:prstDash val="solid"/>
-                    </a:lnTlToBr>
-                    <a:lnBlToTr w="12700" cmpd="sng">
-                      <a:noFill/>
-                      <a:prstDash val="solid"/>
-                    </a:lnBlToTr>
-                    <a:solidFill>
-                      <a:schemeClr val="tx2">
-                        <a:lumMod val="20000"/>
-                        <a:lumOff val="80000"/>
-                      </a:schemeClr>
-                    </a:solidFill>
-                  </a:tcPr>
-                </a:tc>
-                <a:tc>
-                  <a:txBody>
-                    <a:bodyPr/>
-                    <a:lstStyle/>
-                    <a:p>
-                      <a:pPr algn="ctr"/>
-                      <a:endParaRPr lang="en-US" dirty="0"/>
-                    </a:p>
-                  </a:txBody>
-                  <a:tcPr>
-                    <a:lnL w="12700" cap="flat" cmpd="sng" algn="ctr">
-                      <a:solidFill>
-                        <a:schemeClr val="tx1"/>
-                      </a:solidFill>
-                      <a:prstDash val="solid"/>
-                      <a:round/>
-                      <a:headEnd type="none" w="med" len="med"/>
-                      <a:tailEnd type="none" w="med" len="med"/>
-                    </a:lnL>
-                    <a:lnR w="12700" cap="flat" cmpd="sng" algn="ctr">
-                      <a:solidFill>
-                        <a:schemeClr val="tx1"/>
-                      </a:solidFill>
-                      <a:prstDash val="solid"/>
-                      <a:round/>
-                      <a:headEnd type="none" w="med" len="med"/>
-                      <a:tailEnd type="none" w="med" len="med"/>
-                    </a:lnR>
-                    <a:lnT w="12700" cap="flat" cmpd="sng" algn="ctr">
-                      <a:solidFill>
-                        <a:schemeClr val="tx1"/>
-                      </a:solidFill>
-                      <a:prstDash val="solid"/>
-                      <a:round/>
-                      <a:headEnd type="none" w="med" len="med"/>
-                      <a:tailEnd type="none" w="med" len="med"/>
-                    </a:lnT>
-                    <a:lnB w="12700" cap="flat" cmpd="sng" algn="ctr">
-                      <a:solidFill>
-                        <a:schemeClr val="tx1"/>
-                      </a:solidFill>
-                      <a:prstDash val="solid"/>
-                      <a:round/>
-                      <a:headEnd type="none" w="med" len="med"/>
-                      <a:tailEnd type="none" w="med" len="med"/>
-                    </a:lnB>
-                    <a:lnTlToBr w="12700" cmpd="sng">
-                      <a:noFill/>
-                      <a:prstDash val="solid"/>
-                    </a:lnTlToBr>
-                    <a:lnBlToTr w="12700" cmpd="sng">
-                      <a:noFill/>
-                      <a:prstDash val="solid"/>
-                    </a:lnBlToTr>
-                    <a:solidFill>
-                      <a:schemeClr val="tx2">
-                        <a:lumMod val="20000"/>
-                        <a:lumOff val="80000"/>
-                      </a:schemeClr>
-                    </a:solidFill>
-                  </a:tcPr>
-                </a:tc>
-              </a:tr>
-              <a:tr h="209550">
-                <a:tc>
-                  <a:txBody>
-                    <a:bodyPr/>
-                    <a:lstStyle/>
-                    <a:p>
-                      <a:pPr algn="ctr"/>
-                      <a:endParaRPr lang="en-US" dirty="0"/>
-                    </a:p>
-                  </a:txBody>
-                  <a:tcPr>
-                    <a:lnL w="12700" cap="flat" cmpd="sng" algn="ctr">
-                      <a:solidFill>
-                        <a:schemeClr val="tx1"/>
-                      </a:solidFill>
-                      <a:prstDash val="solid"/>
-                      <a:round/>
-                      <a:headEnd type="none" w="med" len="med"/>
-                      <a:tailEnd type="none" w="med" len="med"/>
-                    </a:lnL>
-                    <a:lnR w="12700" cap="flat" cmpd="sng" algn="ctr">
-                      <a:solidFill>
-                        <a:schemeClr val="tx1"/>
-                      </a:solidFill>
-                      <a:prstDash val="solid"/>
-                      <a:round/>
-                      <a:headEnd type="none" w="med" len="med"/>
-                      <a:tailEnd type="none" w="med" len="med"/>
-                    </a:lnR>
-                    <a:lnT w="12700" cap="flat" cmpd="sng" algn="ctr">
-                      <a:solidFill>
-                        <a:schemeClr val="tx1"/>
-                      </a:solidFill>
-                      <a:prstDash val="solid"/>
-                      <a:round/>
-                      <a:headEnd type="none" w="med" len="med"/>
-                      <a:tailEnd type="none" w="med" len="med"/>
-                    </a:lnT>
-                    <a:lnB w="12700" cap="flat" cmpd="sng" algn="ctr">
-                      <a:solidFill>
-                        <a:schemeClr val="tx1"/>
-                      </a:solidFill>
-                      <a:prstDash val="solid"/>
-                      <a:round/>
-                      <a:headEnd type="none" w="med" len="med"/>
-                      <a:tailEnd type="none" w="med" len="med"/>
-                    </a:lnB>
-                    <a:lnTlToBr w="12700" cmpd="sng">
-                      <a:noFill/>
-                      <a:prstDash val="solid"/>
-                    </a:lnTlToBr>
-                    <a:lnBlToTr w="12700" cmpd="sng">
-                      <a:noFill/>
-                      <a:prstDash val="solid"/>
-                    </a:lnBlToTr>
-                    <a:solidFill>
-                      <a:schemeClr val="tx2">
-                        <a:lumMod val="20000"/>
-                        <a:lumOff val="80000"/>
-                      </a:schemeClr>
-                    </a:solidFill>
-                  </a:tcPr>
-                </a:tc>
-                <a:tc>
-                  <a:txBody>
-                    <a:bodyPr/>
-                    <a:lstStyle/>
-                    <a:p>
-                      <a:pPr algn="ctr"/>
-                      <a:endParaRPr lang="en-US"/>
-                    </a:p>
-                  </a:txBody>
-                  <a:tcPr>
-                    <a:lnL w="12700" cap="flat" cmpd="sng" algn="ctr">
-                      <a:solidFill>
-                        <a:schemeClr val="tx1"/>
-                      </a:solidFill>
-                      <a:prstDash val="solid"/>
-                      <a:round/>
-                      <a:headEnd type="none" w="med" len="med"/>
-                      <a:tailEnd type="none" w="med" len="med"/>
-                    </a:lnL>
-                    <a:lnR w="12700" cap="flat" cmpd="sng" algn="ctr">
-                      <a:solidFill>
-                        <a:schemeClr val="tx1"/>
-                      </a:solidFill>
-                      <a:prstDash val="solid"/>
-                      <a:round/>
-                      <a:headEnd type="none" w="med" len="med"/>
-                      <a:tailEnd type="none" w="med" len="med"/>
-                    </a:lnR>
-                    <a:lnT w="12700" cap="flat" cmpd="sng" algn="ctr">
-                      <a:solidFill>
-                        <a:schemeClr val="tx1"/>
-                      </a:solidFill>
-                      <a:prstDash val="solid"/>
-                      <a:round/>
-                      <a:headEnd type="none" w="med" len="med"/>
-                      <a:tailEnd type="none" w="med" len="med"/>
-                    </a:lnT>
-                    <a:lnB w="12700" cap="flat" cmpd="sng" algn="ctr">
-                      <a:solidFill>
-                        <a:schemeClr val="tx1"/>
-                      </a:solidFill>
-                      <a:prstDash val="solid"/>
-                      <a:round/>
-                      <a:headEnd type="none" w="med" len="med"/>
-                      <a:tailEnd type="none" w="med" len="med"/>
-                    </a:lnB>
-                    <a:lnTlToBr w="12700" cmpd="sng">
-                      <a:noFill/>
-                      <a:prstDash val="solid"/>
-                    </a:lnTlToBr>
-                    <a:lnBlToTr w="12700" cmpd="sng">
-                      <a:noFill/>
-                      <a:prstDash val="solid"/>
-                    </a:lnBlToTr>
-                    <a:solidFill>
-                      <a:schemeClr val="tx2">
-                        <a:lumMod val="20000"/>
-                        <a:lumOff val="80000"/>
-                      </a:schemeClr>
-                    </a:solidFill>
-                  </a:tcPr>
-                </a:tc>
-                <a:tc>
-                  <a:txBody>
-                    <a:bodyPr/>
-                    <a:lstStyle/>
-                    <a:p>
-                      <a:pPr algn="ctr"/>
-                      <a:endParaRPr lang="en-US" dirty="0"/>
-                    </a:p>
-                  </a:txBody>
-                  <a:tcPr>
-                    <a:lnL w="12700" cap="flat" cmpd="sng" algn="ctr">
-                      <a:solidFill>
-                        <a:schemeClr val="tx1"/>
-                      </a:solidFill>
-                      <a:prstDash val="solid"/>
-                      <a:round/>
-                      <a:headEnd type="none" w="med" len="med"/>
-                      <a:tailEnd type="none" w="med" len="med"/>
-                    </a:lnL>
-                    <a:lnR w="12700" cap="flat" cmpd="sng" algn="ctr">
-                      <a:solidFill>
-                        <a:schemeClr val="tx1"/>
-                      </a:solidFill>
-                      <a:prstDash val="solid"/>
-                      <a:round/>
-                      <a:headEnd type="none" w="med" len="med"/>
-                      <a:tailEnd type="none" w="med" len="med"/>
-                    </a:lnR>
-                    <a:lnT w="12700" cap="flat" cmpd="sng" algn="ctr">
-                      <a:solidFill>
-                        <a:schemeClr val="tx1"/>
-                      </a:solidFill>
-                      <a:prstDash val="solid"/>
-                      <a:round/>
-                      <a:headEnd type="none" w="med" len="med"/>
-                      <a:tailEnd type="none" w="med" len="med"/>
-                    </a:lnT>
-                    <a:lnB w="12700" cap="flat" cmpd="sng" algn="ctr">
-                      <a:solidFill>
-                        <a:schemeClr val="tx1"/>
-                      </a:solidFill>
-                      <a:prstDash val="solid"/>
-                      <a:round/>
-                      <a:headEnd type="none" w="med" len="med"/>
-                      <a:tailEnd type="none" w="med" len="med"/>
-                    </a:lnB>
-                    <a:lnTlToBr w="12700" cmpd="sng">
-                      <a:noFill/>
-                      <a:prstDash val="solid"/>
-                    </a:lnTlToBr>
-                    <a:lnBlToTr w="12700" cmpd="sng">
-                      <a:noFill/>
-                      <a:prstDash val="solid"/>
-                    </a:lnBlToTr>
-                    <a:solidFill>
-                      <a:schemeClr val="tx2">
-                        <a:lumMod val="20000"/>
-                        <a:lumOff val="80000"/>
-                      </a:schemeClr>
-                    </a:solidFill>
-                  </a:tcPr>
-                </a:tc>
-                <a:tc>
-                  <a:txBody>
-                    <a:bodyPr/>
-                    <a:lstStyle/>
-                    <a:p>
-                      <a:pPr algn="ctr"/>
-                      <a:endParaRPr lang="en-US"/>
-                    </a:p>
-                  </a:txBody>
-                  <a:tcPr>
-                    <a:lnL w="12700" cap="flat" cmpd="sng" algn="ctr">
-                      <a:solidFill>
-                        <a:schemeClr val="tx1"/>
-                      </a:solidFill>
-                      <a:prstDash val="solid"/>
-                      <a:round/>
-                      <a:headEnd type="none" w="med" len="med"/>
-                      <a:tailEnd type="none" w="med" len="med"/>
-                    </a:lnL>
-                    <a:lnR w="12700" cap="flat" cmpd="sng" algn="ctr">
-                      <a:solidFill>
-                        <a:schemeClr val="tx1"/>
-                      </a:solidFill>
-                      <a:prstDash val="solid"/>
-                      <a:round/>
-                      <a:headEnd type="none" w="med" len="med"/>
-                      <a:tailEnd type="none" w="med" len="med"/>
-                    </a:lnR>
-                    <a:lnT w="12700" cap="flat" cmpd="sng" algn="ctr">
-                      <a:solidFill>
-                        <a:schemeClr val="tx1"/>
-                      </a:solidFill>
-                      <a:prstDash val="solid"/>
-                      <a:round/>
-                      <a:headEnd type="none" w="med" len="med"/>
-                      <a:tailEnd type="none" w="med" len="med"/>
-                    </a:lnT>
-                    <a:lnB w="12700" cap="flat" cmpd="sng" algn="ctr">
-                      <a:solidFill>
-                        <a:schemeClr val="tx1"/>
-                      </a:solidFill>
-                      <a:prstDash val="solid"/>
-                      <a:round/>
-                      <a:headEnd type="none" w="med" len="med"/>
-                      <a:tailEnd type="none" w="med" len="med"/>
-                    </a:lnB>
-                    <a:lnTlToBr w="12700" cmpd="sng">
-                      <a:noFill/>
-                      <a:prstDash val="solid"/>
-                    </a:lnTlToBr>
-                    <a:lnBlToTr w="12700" cmpd="sng">
-                      <a:noFill/>
-                      <a:prstDash val="solid"/>
-                    </a:lnBlToTr>
-                    <a:solidFill>
-                      <a:schemeClr val="tx2">
-                        <a:lumMod val="20000"/>
-                        <a:lumOff val="80000"/>
-                      </a:schemeClr>
-                    </a:solidFill>
-                  </a:tcPr>
-                </a:tc>
-                <a:tc>
-                  <a:txBody>
-                    <a:bodyPr/>
-                    <a:lstStyle/>
-                    <a:p>
-                      <a:pPr algn="ctr"/>
-                      <a:endParaRPr lang="en-US" dirty="0"/>
-                    </a:p>
-                  </a:txBody>
-                  <a:tcPr>
-                    <a:lnL w="12700" cap="flat" cmpd="sng" algn="ctr">
-                      <a:solidFill>
-                        <a:schemeClr val="tx1"/>
-                      </a:solidFill>
-                      <a:prstDash val="solid"/>
-                      <a:round/>
-                      <a:headEnd type="none" w="med" len="med"/>
-                      <a:tailEnd type="none" w="med" len="med"/>
-                    </a:lnL>
-                    <a:lnR w="12700" cap="flat" cmpd="sng" algn="ctr">
-                      <a:solidFill>
-                        <a:schemeClr val="tx1"/>
-                      </a:solidFill>
-                      <a:prstDash val="solid"/>
-                      <a:round/>
-                      <a:headEnd type="none" w="med" len="med"/>
-                      <a:tailEnd type="none" w="med" len="med"/>
-                    </a:lnR>
-                    <a:lnT w="12700" cap="flat" cmpd="sng" algn="ctr">
-                      <a:solidFill>
-                        <a:schemeClr val="tx1"/>
-                      </a:solidFill>
-                      <a:prstDash val="solid"/>
-                      <a:round/>
-                      <a:headEnd type="none" w="med" len="med"/>
-                      <a:tailEnd type="none" w="med" len="med"/>
-                    </a:lnT>
-                    <a:lnB w="12700" cap="flat" cmpd="sng" algn="ctr">
-                      <a:solidFill>
-                        <a:schemeClr val="tx1"/>
-                      </a:solidFill>
-                      <a:prstDash val="solid"/>
-                      <a:round/>
-                      <a:headEnd type="none" w="med" len="med"/>
-                      <a:tailEnd type="none" w="med" len="med"/>
-                    </a:lnB>
-                    <a:lnTlToBr w="12700" cmpd="sng">
-                      <a:noFill/>
-                      <a:prstDash val="solid"/>
-                    </a:lnTlToBr>
-                    <a:lnBlToTr w="12700" cmpd="sng">
-                      <a:noFill/>
-                      <a:prstDash val="solid"/>
-                    </a:lnBlToTr>
-                    <a:solidFill>
-                      <a:schemeClr val="tx2">
-                        <a:lumMod val="20000"/>
-                        <a:lumOff val="80000"/>
-                      </a:schemeClr>
-                    </a:solidFill>
-                  </a:tcPr>
-                </a:tc>
-                <a:tc>
-                  <a:txBody>
-                    <a:bodyPr/>
-                    <a:lstStyle/>
-                    <a:p>
-                      <a:pPr algn="ctr"/>
-                      <a:endParaRPr lang="en-US" dirty="0"/>
-                    </a:p>
-                  </a:txBody>
-                  <a:tcPr>
-                    <a:lnL w="12700" cap="flat" cmpd="sng" algn="ctr">
-                      <a:solidFill>
-                        <a:schemeClr val="tx1"/>
-                      </a:solidFill>
-                      <a:prstDash val="solid"/>
-                      <a:round/>
-                      <a:headEnd type="none" w="med" len="med"/>
-                      <a:tailEnd type="none" w="med" len="med"/>
-                    </a:lnL>
-                    <a:lnR w="12700" cap="flat" cmpd="sng" algn="ctr">
-                      <a:solidFill>
-                        <a:schemeClr val="tx1"/>
-                      </a:solidFill>
-                      <a:prstDash val="solid"/>
-                      <a:round/>
-                      <a:headEnd type="none" w="med" len="med"/>
-                      <a:tailEnd type="none" w="med" len="med"/>
-                    </a:lnR>
-                    <a:lnT w="12700" cap="flat" cmpd="sng" algn="ctr">
-                      <a:solidFill>
-                        <a:schemeClr val="tx1"/>
-                      </a:solidFill>
-                      <a:prstDash val="solid"/>
-                      <a:round/>
-                      <a:headEnd type="none" w="med" len="med"/>
-                      <a:tailEnd type="none" w="med" len="med"/>
-                    </a:lnT>
-                    <a:lnB w="12700" cap="flat" cmpd="sng" algn="ctr">
-                      <a:solidFill>
-                        <a:schemeClr val="tx1"/>
-                      </a:solidFill>
-                      <a:prstDash val="solid"/>
-                      <a:round/>
-                      <a:headEnd type="none" w="med" len="med"/>
-                      <a:tailEnd type="none" w="med" len="med"/>
-                    </a:lnB>
-                    <a:lnTlToBr w="12700" cmpd="sng">
-                      <a:noFill/>
-                      <a:prstDash val="solid"/>
-                    </a:lnTlToBr>
-                    <a:lnBlToTr w="12700" cmpd="sng">
-                      <a:noFill/>
-                      <a:prstDash val="solid"/>
-                    </a:lnBlToTr>
-                    <a:solidFill>
-                      <a:schemeClr val="tx2">
-                        <a:lumMod val="20000"/>
-                        <a:lumOff val="80000"/>
-                      </a:schemeClr>
-                    </a:solidFill>
-                  </a:tcPr>
-                </a:tc>
-                <a:tc>
-                  <a:txBody>
-                    <a:bodyPr/>
-                    <a:lstStyle/>
-                    <a:p>
-                      <a:pPr algn="ctr"/>
-                      <a:endParaRPr lang="en-US" dirty="0"/>
-                    </a:p>
-                  </a:txBody>
-                  <a:tcPr>
-                    <a:lnL w="12700" cap="flat" cmpd="sng" algn="ctr">
-                      <a:solidFill>
-                        <a:schemeClr val="tx1"/>
-                      </a:solidFill>
-                      <a:prstDash val="solid"/>
-                      <a:round/>
-                      <a:headEnd type="none" w="med" len="med"/>
-                      <a:tailEnd type="none" w="med" len="med"/>
-                    </a:lnL>
-                    <a:lnR w="12700" cap="flat" cmpd="sng" algn="ctr">
-                      <a:solidFill>
-                        <a:schemeClr val="tx1"/>
-                      </a:solidFill>
-                      <a:prstDash val="solid"/>
-                      <a:round/>
-                      <a:headEnd type="none" w="med" len="med"/>
-                      <a:tailEnd type="none" w="med" len="med"/>
-                    </a:lnR>
-                    <a:lnT w="12700" cap="flat" cmpd="sng" algn="ctr">
-                      <a:solidFill>
-                        <a:schemeClr val="tx1"/>
-                      </a:solidFill>
-                      <a:prstDash val="solid"/>
-                      <a:round/>
-                      <a:headEnd type="none" w="med" len="med"/>
-                      <a:tailEnd type="none" w="med" len="med"/>
-                    </a:lnT>
-                    <a:lnB w="12700" cap="flat" cmpd="sng" algn="ctr">
-                      <a:solidFill>
-                        <a:schemeClr val="tx1"/>
-                      </a:solidFill>
-                      <a:prstDash val="solid"/>
-                      <a:round/>
-                      <a:headEnd type="none" w="med" len="med"/>
-                      <a:tailEnd type="none" w="med" len="med"/>
-                    </a:lnB>
-                    <a:lnTlToBr w="12700" cmpd="sng">
-                      <a:noFill/>
-                      <a:prstDash val="solid"/>
-                    </a:lnTlToBr>
-                    <a:lnBlToTr w="12700" cmpd="sng">
-                      <a:noFill/>
-                      <a:prstDash val="solid"/>
-                    </a:lnBlToTr>
-                    <a:solidFill>
-                      <a:schemeClr val="tx2">
-                        <a:lumMod val="20000"/>
-                        <a:lumOff val="80000"/>
-                      </a:schemeClr>
-                    </a:solidFill>
-                  </a:tcPr>
-                </a:tc>
-                <a:tc>
-                  <a:txBody>
-                    <a:bodyPr/>
-                    <a:lstStyle/>
-                    <a:p>
-                      <a:pPr algn="ctr"/>
-                      <a:endParaRPr lang="en-US" dirty="0"/>
-                    </a:p>
-                  </a:txBody>
-                  <a:tcPr>
-                    <a:lnL w="12700" cap="flat" cmpd="sng" algn="ctr">
-                      <a:solidFill>
-                        <a:schemeClr val="tx1"/>
-                      </a:solidFill>
-                      <a:prstDash val="solid"/>
-                      <a:round/>
-                      <a:headEnd type="none" w="med" len="med"/>
-                      <a:tailEnd type="none" w="med" len="med"/>
-                    </a:lnL>
-                    <a:lnR w="12700" cap="flat" cmpd="sng" algn="ctr">
-                      <a:solidFill>
-                        <a:schemeClr val="tx1"/>
-                      </a:solidFill>
-                      <a:prstDash val="solid"/>
-                      <a:round/>
-                      <a:headEnd type="none" w="med" len="med"/>
-                      <a:tailEnd type="none" w="med" len="med"/>
-                    </a:lnR>
-                    <a:lnT w="12700" cap="flat" cmpd="sng" algn="ctr">
-                      <a:solidFill>
-                        <a:schemeClr val="tx1"/>
-                      </a:solidFill>
-                      <a:prstDash val="solid"/>
-                      <a:round/>
-                      <a:headEnd type="none" w="med" len="med"/>
-                      <a:tailEnd type="none" w="med" len="med"/>
-                    </a:lnT>
-                    <a:lnB w="12700" cap="flat" cmpd="sng" algn="ctr">
-                      <a:solidFill>
-                        <a:schemeClr val="tx1"/>
-                      </a:solidFill>
-                      <a:prstDash val="solid"/>
-                      <a:round/>
-                      <a:headEnd type="none" w="med" len="med"/>
-                      <a:tailEnd type="none" w="med" len="med"/>
-                    </a:lnB>
-                    <a:lnTlToBr w="12700" cmpd="sng">
-                      <a:noFill/>
-                      <a:prstDash val="solid"/>
-                    </a:lnTlToBr>
-                    <a:lnBlToTr w="12700" cmpd="sng">
-                      <a:noFill/>
-                      <a:prstDash val="solid"/>
-                    </a:lnBlToTr>
-                    <a:solidFill>
-                      <a:schemeClr val="tx2">
-                        <a:lumMod val="20000"/>
-                        <a:lumOff val="80000"/>
-                      </a:schemeClr>
-                    </a:solidFill>
-                  </a:tcPr>
-                </a:tc>
-              </a:tr>
-              <a:tr h="209550">
+              <a:tr h="152400">
                 <a:tc>
                   <a:txBody>
                     <a:bodyPr/>
@@ -6201,60 +3814,17 @@
                     <a:p>
                       <a:pPr algn="ctr"/>
                       <a:r>
-                        <a:rPr lang="en-US" dirty="0" smtClean="0"/>
+                        <a:rPr lang="en-US" sz="1400" dirty="0" smtClean="0"/>
                         <a:t>V</a:t>
                       </a:r>
-                      <a:endParaRPr lang="en-US" dirty="0"/>
+                      <a:endParaRPr lang="en-US" sz="1400" dirty="0"/>
                     </a:p>
                   </a:txBody>
                   <a:tcPr>
-                    <a:lnL w="12700" cap="flat" cmpd="sng" algn="ctr">
-                      <a:solidFill>
-                        <a:schemeClr val="tx1"/>
-                      </a:solidFill>
-                      <a:prstDash val="solid"/>
-                      <a:round/>
-                      <a:headEnd type="none" w="med" len="med"/>
-                      <a:tailEnd type="none" w="med" len="med"/>
-                    </a:lnL>
-                    <a:lnR w="12700" cap="flat" cmpd="sng" algn="ctr">
-                      <a:solidFill>
-                        <a:schemeClr val="tx1"/>
-                      </a:solidFill>
-                      <a:prstDash val="solid"/>
-                      <a:round/>
-                      <a:headEnd type="none" w="med" len="med"/>
-                      <a:tailEnd type="none" w="med" len="med"/>
-                    </a:lnR>
-                    <a:lnT w="12700" cap="flat" cmpd="sng" algn="ctr">
-                      <a:solidFill>
-                        <a:schemeClr val="tx1"/>
-                      </a:solidFill>
-                      <a:prstDash val="solid"/>
-                      <a:round/>
-                      <a:headEnd type="none" w="med" len="med"/>
-                      <a:tailEnd type="none" w="med" len="med"/>
-                    </a:lnT>
-                    <a:lnB w="12700" cap="flat" cmpd="sng" algn="ctr">
-                      <a:solidFill>
-                        <a:schemeClr val="tx1"/>
-                      </a:solidFill>
-                      <a:prstDash val="solid"/>
-                      <a:round/>
-                      <a:headEnd type="none" w="med" len="med"/>
-                      <a:tailEnd type="none" w="med" len="med"/>
-                    </a:lnB>
-                    <a:lnTlToBr w="12700" cmpd="sng">
-                      <a:noFill/>
-                      <a:prstDash val="solid"/>
-                    </a:lnTlToBr>
-                    <a:lnBlToTr w="12700" cmpd="sng">
-                      <a:noFill/>
-                      <a:prstDash val="solid"/>
-                    </a:lnBlToTr>
                     <a:solidFill>
-                      <a:schemeClr val="bg1">
-                        <a:lumMod val="85000"/>
+                      <a:schemeClr val="accent1">
+                        <a:lumMod val="40000"/>
+                        <a:lumOff val="60000"/>
                       </a:schemeClr>
                     </a:solidFill>
                   </a:tcPr>
@@ -6266,494 +3836,17 @@
                     <a:p>
                       <a:pPr algn="ctr"/>
                       <a:r>
-                        <a:rPr lang="en-US" dirty="0" smtClean="0"/>
+                        <a:rPr lang="en-US" sz="1400" dirty="0" smtClean="0"/>
                         <a:t>D</a:t>
                       </a:r>
-                      <a:endParaRPr lang="en-US" dirty="0"/>
+                      <a:endParaRPr lang="en-US" sz="1400" dirty="0"/>
                     </a:p>
                   </a:txBody>
                   <a:tcPr>
-                    <a:lnL w="12700" cap="flat" cmpd="sng" algn="ctr">
-                      <a:solidFill>
-                        <a:schemeClr val="tx1"/>
-                      </a:solidFill>
-                      <a:prstDash val="solid"/>
-                      <a:round/>
-                      <a:headEnd type="none" w="med" len="med"/>
-                      <a:tailEnd type="none" w="med" len="med"/>
-                    </a:lnL>
-                    <a:lnR w="12700" cap="flat" cmpd="sng" algn="ctr">
-                      <a:solidFill>
-                        <a:schemeClr val="tx1"/>
-                      </a:solidFill>
-                      <a:prstDash val="solid"/>
-                      <a:round/>
-                      <a:headEnd type="none" w="med" len="med"/>
-                      <a:tailEnd type="none" w="med" len="med"/>
-                    </a:lnR>
-                    <a:lnT w="12700" cap="flat" cmpd="sng" algn="ctr">
-                      <a:solidFill>
-                        <a:schemeClr val="tx1"/>
-                      </a:solidFill>
-                      <a:prstDash val="solid"/>
-                      <a:round/>
-                      <a:headEnd type="none" w="med" len="med"/>
-                      <a:tailEnd type="none" w="med" len="med"/>
-                    </a:lnT>
-                    <a:lnB w="12700" cap="flat" cmpd="sng" algn="ctr">
-                      <a:solidFill>
-                        <a:schemeClr val="tx1"/>
-                      </a:solidFill>
-                      <a:prstDash val="solid"/>
-                      <a:round/>
-                      <a:headEnd type="none" w="med" len="med"/>
-                      <a:tailEnd type="none" w="med" len="med"/>
-                    </a:lnB>
-                    <a:lnTlToBr w="12700" cmpd="sng">
-                      <a:noFill/>
-                      <a:prstDash val="solid"/>
-                    </a:lnTlToBr>
-                    <a:lnBlToTr w="12700" cmpd="sng">
-                      <a:noFill/>
-                      <a:prstDash val="solid"/>
-                    </a:lnBlToTr>
                     <a:solidFill>
-                      <a:schemeClr val="bg1">
-                        <a:lumMod val="85000"/>
-                      </a:schemeClr>
-                    </a:solidFill>
-                  </a:tcPr>
-                </a:tc>
-                <a:tc gridSpan="6">
-                  <a:txBody>
-                    <a:bodyPr/>
-                    <a:lstStyle/>
-                    <a:p>
-                      <a:pPr algn="l"/>
-                      <a:r>
-                        <a:rPr lang="en-US" smtClean="0"/>
-                        <a:t>Tag</a:t>
-                      </a:r>
-                      <a:endParaRPr lang="en-US" dirty="0"/>
-                    </a:p>
-                  </a:txBody>
-                  <a:tcPr>
-                    <a:lnL w="12700" cap="flat" cmpd="sng" algn="ctr">
-                      <a:solidFill>
-                        <a:schemeClr val="tx1"/>
-                      </a:solidFill>
-                      <a:prstDash val="solid"/>
-                      <a:round/>
-                      <a:headEnd type="none" w="med" len="med"/>
-                      <a:tailEnd type="none" w="med" len="med"/>
-                    </a:lnL>
-                    <a:lnR w="12700" cap="flat" cmpd="sng" algn="ctr">
-                      <a:solidFill>
-                        <a:schemeClr val="tx1"/>
-                      </a:solidFill>
-                      <a:prstDash val="solid"/>
-                      <a:round/>
-                      <a:headEnd type="none" w="med" len="med"/>
-                      <a:tailEnd type="none" w="med" len="med"/>
-                    </a:lnR>
-                    <a:lnT w="12700" cap="flat" cmpd="sng" algn="ctr">
-                      <a:solidFill>
-                        <a:schemeClr val="tx1"/>
-                      </a:solidFill>
-                      <a:prstDash val="solid"/>
-                      <a:round/>
-                      <a:headEnd type="none" w="med" len="med"/>
-                      <a:tailEnd type="none" w="med" len="med"/>
-                    </a:lnT>
-                    <a:lnB w="12700" cap="flat" cmpd="sng" algn="ctr">
-                      <a:solidFill>
-                        <a:schemeClr val="tx1"/>
-                      </a:solidFill>
-                      <a:prstDash val="solid"/>
-                      <a:round/>
-                      <a:headEnd type="none" w="med" len="med"/>
-                      <a:tailEnd type="none" w="med" len="med"/>
-                    </a:lnB>
-                    <a:lnTlToBr w="12700" cmpd="sng">
-                      <a:noFill/>
-                      <a:prstDash val="solid"/>
-                    </a:lnTlToBr>
-                    <a:lnBlToTr w="12700" cmpd="sng">
-                      <a:noFill/>
-                      <a:prstDash val="solid"/>
-                    </a:lnBlToTr>
-                    <a:solidFill>
-                      <a:schemeClr val="bg1">
-                        <a:lumMod val="85000"/>
-                      </a:schemeClr>
-                    </a:solidFill>
-                  </a:tcPr>
-                </a:tc>
-                <a:tc hMerge="1">
-                  <a:txBody>
-                    <a:bodyPr/>
-                    <a:lstStyle/>
-                    <a:p>
-                      <a:pPr algn="ctr"/>
-                      <a:endParaRPr lang="en-US" dirty="0"/>
-                    </a:p>
-                  </a:txBody>
-                  <a:tcPr>
-                    <a:lnL w="12700" cap="flat" cmpd="sng" algn="ctr">
-                      <a:solidFill>
-                        <a:schemeClr val="tx1"/>
-                      </a:solidFill>
-                      <a:prstDash val="solid"/>
-                      <a:round/>
-                      <a:headEnd type="none" w="med" len="med"/>
-                      <a:tailEnd type="none" w="med" len="med"/>
-                    </a:lnL>
-                    <a:lnR w="12700" cap="flat" cmpd="sng" algn="ctr">
-                      <a:solidFill>
-                        <a:schemeClr val="tx1"/>
-                      </a:solidFill>
-                      <a:prstDash val="solid"/>
-                      <a:round/>
-                      <a:headEnd type="none" w="med" len="med"/>
-                      <a:tailEnd type="none" w="med" len="med"/>
-                    </a:lnR>
-                    <a:lnT w="12700" cap="flat" cmpd="sng" algn="ctr">
-                      <a:solidFill>
-                        <a:schemeClr val="tx1"/>
-                      </a:solidFill>
-                      <a:prstDash val="solid"/>
-                      <a:round/>
-                      <a:headEnd type="none" w="med" len="med"/>
-                      <a:tailEnd type="none" w="med" len="med"/>
-                    </a:lnT>
-                    <a:lnB w="12700" cap="flat" cmpd="sng" algn="ctr">
-                      <a:solidFill>
-                        <a:schemeClr val="tx1"/>
-                      </a:solidFill>
-                      <a:prstDash val="solid"/>
-                      <a:round/>
-                      <a:headEnd type="none" w="med" len="med"/>
-                      <a:tailEnd type="none" w="med" len="med"/>
-                    </a:lnB>
-                    <a:lnTlToBr w="12700" cmpd="sng">
-                      <a:noFill/>
-                      <a:prstDash val="solid"/>
-                    </a:lnTlToBr>
-                    <a:lnBlToTr w="12700" cmpd="sng">
-                      <a:noFill/>
-                      <a:prstDash val="solid"/>
-                    </a:lnBlToTr>
-                    <a:solidFill>
-                      <a:schemeClr val="bg1">
-                        <a:lumMod val="85000"/>
-                      </a:schemeClr>
-                    </a:solidFill>
-                  </a:tcPr>
-                </a:tc>
-                <a:tc hMerge="1">
-                  <a:txBody>
-                    <a:bodyPr/>
-                    <a:lstStyle/>
-                    <a:p>
-                      <a:pPr algn="ctr"/>
-                      <a:endParaRPr lang="en-US" dirty="0"/>
-                    </a:p>
-                  </a:txBody>
-                  <a:tcPr>
-                    <a:lnL w="12700" cap="flat" cmpd="sng" algn="ctr">
-                      <a:solidFill>
-                        <a:schemeClr val="tx1"/>
-                      </a:solidFill>
-                      <a:prstDash val="solid"/>
-                      <a:round/>
-                      <a:headEnd type="none" w="med" len="med"/>
-                      <a:tailEnd type="none" w="med" len="med"/>
-                    </a:lnL>
-                    <a:lnR w="12700" cap="flat" cmpd="sng" algn="ctr">
-                      <a:solidFill>
-                        <a:schemeClr val="tx1"/>
-                      </a:solidFill>
-                      <a:prstDash val="solid"/>
-                      <a:round/>
-                      <a:headEnd type="none" w="med" len="med"/>
-                      <a:tailEnd type="none" w="med" len="med"/>
-                    </a:lnR>
-                    <a:lnT w="12700" cap="flat" cmpd="sng" algn="ctr">
-                      <a:solidFill>
-                        <a:schemeClr val="tx1"/>
-                      </a:solidFill>
-                      <a:prstDash val="solid"/>
-                      <a:round/>
-                      <a:headEnd type="none" w="med" len="med"/>
-                      <a:tailEnd type="none" w="med" len="med"/>
-                    </a:lnT>
-                    <a:lnB w="12700" cap="flat" cmpd="sng" algn="ctr">
-                      <a:solidFill>
-                        <a:schemeClr val="tx1"/>
-                      </a:solidFill>
-                      <a:prstDash val="solid"/>
-                      <a:round/>
-                      <a:headEnd type="none" w="med" len="med"/>
-                      <a:tailEnd type="none" w="med" len="med"/>
-                    </a:lnB>
-                    <a:lnTlToBr w="12700" cmpd="sng">
-                      <a:noFill/>
-                      <a:prstDash val="solid"/>
-                    </a:lnTlToBr>
-                    <a:lnBlToTr w="12700" cmpd="sng">
-                      <a:noFill/>
-                      <a:prstDash val="solid"/>
-                    </a:lnBlToTr>
-                    <a:solidFill>
-                      <a:schemeClr val="bg1">
-                        <a:lumMod val="85000"/>
-                      </a:schemeClr>
-                    </a:solidFill>
-                  </a:tcPr>
-                </a:tc>
-                <a:tc hMerge="1">
-                  <a:txBody>
-                    <a:bodyPr/>
-                    <a:lstStyle/>
-                    <a:p>
-                      <a:pPr algn="ctr"/>
-                      <a:endParaRPr lang="en-US" dirty="0"/>
-                    </a:p>
-                  </a:txBody>
-                  <a:tcPr>
-                    <a:lnL w="12700" cap="flat" cmpd="sng" algn="ctr">
-                      <a:solidFill>
-                        <a:schemeClr val="tx1"/>
-                      </a:solidFill>
-                      <a:prstDash val="solid"/>
-                      <a:round/>
-                      <a:headEnd type="none" w="med" len="med"/>
-                      <a:tailEnd type="none" w="med" len="med"/>
-                    </a:lnL>
-                    <a:lnR w="12700" cap="flat" cmpd="sng" algn="ctr">
-                      <a:solidFill>
-                        <a:schemeClr val="tx1"/>
-                      </a:solidFill>
-                      <a:prstDash val="solid"/>
-                      <a:round/>
-                      <a:headEnd type="none" w="med" len="med"/>
-                      <a:tailEnd type="none" w="med" len="med"/>
-                    </a:lnR>
-                    <a:lnT w="12700" cap="flat" cmpd="sng" algn="ctr">
-                      <a:solidFill>
-                        <a:schemeClr val="tx1"/>
-                      </a:solidFill>
-                      <a:prstDash val="solid"/>
-                      <a:round/>
-                      <a:headEnd type="none" w="med" len="med"/>
-                      <a:tailEnd type="none" w="med" len="med"/>
-                    </a:lnT>
-                    <a:lnB w="12700" cap="flat" cmpd="sng" algn="ctr">
-                      <a:solidFill>
-                        <a:schemeClr val="tx1"/>
-                      </a:solidFill>
-                      <a:prstDash val="solid"/>
-                      <a:round/>
-                      <a:headEnd type="none" w="med" len="med"/>
-                      <a:tailEnd type="none" w="med" len="med"/>
-                    </a:lnB>
-                    <a:lnTlToBr w="12700" cmpd="sng">
-                      <a:noFill/>
-                      <a:prstDash val="solid"/>
-                    </a:lnTlToBr>
-                    <a:lnBlToTr w="12700" cmpd="sng">
-                      <a:noFill/>
-                      <a:prstDash val="solid"/>
-                    </a:lnBlToTr>
-                    <a:solidFill>
-                      <a:schemeClr val="bg1">
-                        <a:lumMod val="85000"/>
-                      </a:schemeClr>
-                    </a:solidFill>
-                  </a:tcPr>
-                </a:tc>
-                <a:tc hMerge="1">
-                  <a:txBody>
-                    <a:bodyPr/>
-                    <a:lstStyle/>
-                    <a:p>
-                      <a:pPr algn="ctr"/>
-                      <a:endParaRPr lang="en-US" dirty="0"/>
-                    </a:p>
-                  </a:txBody>
-                  <a:tcPr>
-                    <a:lnL w="12700" cap="flat" cmpd="sng" algn="ctr">
-                      <a:solidFill>
-                        <a:schemeClr val="tx1"/>
-                      </a:solidFill>
-                      <a:prstDash val="solid"/>
-                      <a:round/>
-                      <a:headEnd type="none" w="med" len="med"/>
-                      <a:tailEnd type="none" w="med" len="med"/>
-                    </a:lnL>
-                    <a:lnR w="12700" cap="flat" cmpd="sng" algn="ctr">
-                      <a:solidFill>
-                        <a:schemeClr val="tx1"/>
-                      </a:solidFill>
-                      <a:prstDash val="solid"/>
-                      <a:round/>
-                      <a:headEnd type="none" w="med" len="med"/>
-                      <a:tailEnd type="none" w="med" len="med"/>
-                    </a:lnR>
-                    <a:lnT w="12700" cap="flat" cmpd="sng" algn="ctr">
-                      <a:solidFill>
-                        <a:schemeClr val="tx1"/>
-                      </a:solidFill>
-                      <a:prstDash val="solid"/>
-                      <a:round/>
-                      <a:headEnd type="none" w="med" len="med"/>
-                      <a:tailEnd type="none" w="med" len="med"/>
-                    </a:lnT>
-                    <a:lnB w="12700" cap="flat" cmpd="sng" algn="ctr">
-                      <a:solidFill>
-                        <a:schemeClr val="tx1"/>
-                      </a:solidFill>
-                      <a:prstDash val="solid"/>
-                      <a:round/>
-                      <a:headEnd type="none" w="med" len="med"/>
-                      <a:tailEnd type="none" w="med" len="med"/>
-                    </a:lnB>
-                    <a:lnTlToBr w="12700" cmpd="sng">
-                      <a:noFill/>
-                      <a:prstDash val="solid"/>
-                    </a:lnTlToBr>
-                    <a:lnBlToTr w="12700" cmpd="sng">
-                      <a:noFill/>
-                      <a:prstDash val="solid"/>
-                    </a:lnBlToTr>
-                    <a:solidFill>
-                      <a:schemeClr val="bg1">
-                        <a:lumMod val="85000"/>
-                      </a:schemeClr>
-                    </a:solidFill>
-                  </a:tcPr>
-                </a:tc>
-                <a:tc hMerge="1">
-                  <a:txBody>
-                    <a:bodyPr/>
-                    <a:lstStyle/>
-                    <a:p>
-                      <a:pPr algn="ctr"/>
-                      <a:endParaRPr lang="en-US" dirty="0"/>
-                    </a:p>
-                  </a:txBody>
-                  <a:tcPr>
-                    <a:lnL w="12700" cap="flat" cmpd="sng" algn="ctr">
-                      <a:solidFill>
-                        <a:schemeClr val="tx1"/>
-                      </a:solidFill>
-                      <a:prstDash val="solid"/>
-                      <a:round/>
-                      <a:headEnd type="none" w="med" len="med"/>
-                      <a:tailEnd type="none" w="med" len="med"/>
-                    </a:lnL>
-                    <a:lnR w="12700" cap="flat" cmpd="sng" algn="ctr">
-                      <a:solidFill>
-                        <a:schemeClr val="tx1"/>
-                      </a:solidFill>
-                      <a:prstDash val="solid"/>
-                      <a:round/>
-                      <a:headEnd type="none" w="med" len="med"/>
-                      <a:tailEnd type="none" w="med" len="med"/>
-                    </a:lnR>
-                    <a:lnT w="12700" cap="flat" cmpd="sng" algn="ctr">
-                      <a:solidFill>
-                        <a:schemeClr val="tx1"/>
-                      </a:solidFill>
-                      <a:prstDash val="solid"/>
-                      <a:round/>
-                      <a:headEnd type="none" w="med" len="med"/>
-                      <a:tailEnd type="none" w="med" len="med"/>
-                    </a:lnT>
-                    <a:lnB w="12700" cap="flat" cmpd="sng" algn="ctr">
-                      <a:solidFill>
-                        <a:schemeClr val="tx1"/>
-                      </a:solidFill>
-                      <a:prstDash val="solid"/>
-                      <a:round/>
-                      <a:headEnd type="none" w="med" len="med"/>
-                      <a:tailEnd type="none" w="med" len="med"/>
-                    </a:lnB>
-                    <a:lnTlToBr w="12700" cmpd="sng">
-                      <a:noFill/>
-                      <a:prstDash val="solid"/>
-                    </a:lnTlToBr>
-                    <a:lnBlToTr w="12700" cmpd="sng">
-                      <a:noFill/>
-                      <a:prstDash val="solid"/>
-                    </a:lnBlToTr>
-                    <a:solidFill>
-                      <a:schemeClr val="bg1">
-                        <a:lumMod val="85000"/>
-                      </a:schemeClr>
-                    </a:solidFill>
-                  </a:tcPr>
-                </a:tc>
-              </a:tr>
-              <a:tr h="209550">
-                <a:tc>
-                  <a:txBody>
-                    <a:bodyPr/>
-                    <a:lstStyle/>
-                    <a:p>
-                      <a:pPr algn="ctr"/>
-                      <a:endParaRPr lang="en-US" dirty="0"/>
-                    </a:p>
-                  </a:txBody>
-                  <a:tcPr>
-                    <a:lnL w="12700" cap="flat" cmpd="sng" algn="ctr">
-                      <a:solidFill>
-                        <a:schemeClr val="tx1"/>
-                      </a:solidFill>
-                      <a:prstDash val="solid"/>
-                      <a:round/>
-                      <a:headEnd type="none" w="med" len="med"/>
-                      <a:tailEnd type="none" w="med" len="med"/>
-                    </a:lnL>
-                    <a:lnR w="12700" cap="flat" cmpd="sng" algn="ctr">
-                      <a:solidFill>
-                        <a:schemeClr val="tx1"/>
-                      </a:solidFill>
-                      <a:prstDash val="solid"/>
-                      <a:round/>
-                      <a:headEnd type="none" w="med" len="med"/>
-                      <a:tailEnd type="none" w="med" len="med"/>
-                    </a:lnR>
-                    <a:lnT w="12700" cap="flat" cmpd="sng" algn="ctr">
-                      <a:solidFill>
-                        <a:schemeClr val="tx1"/>
-                      </a:solidFill>
-                      <a:prstDash val="solid"/>
-                      <a:round/>
-                      <a:headEnd type="none" w="med" len="med"/>
-                      <a:tailEnd type="none" w="med" len="med"/>
-                    </a:lnT>
-                    <a:lnB w="12700" cap="flat" cmpd="sng" algn="ctr">
-                      <a:solidFill>
-                        <a:schemeClr val="tx1"/>
-                      </a:solidFill>
-                      <a:prstDash val="solid"/>
-                      <a:round/>
-                      <a:headEnd type="none" w="med" len="med"/>
-                      <a:tailEnd type="none" w="med" len="med"/>
-                    </a:lnB>
-                    <a:lnTlToBr w="12700" cmpd="sng">
-                      <a:noFill/>
-                      <a:prstDash val="solid"/>
-                    </a:lnTlToBr>
-                    <a:lnBlToTr w="12700" cmpd="sng">
-                      <a:noFill/>
-                      <a:prstDash val="solid"/>
-                    </a:lnBlToTr>
-                    <a:solidFill>
-                      <a:schemeClr val="tx2">
-                        <a:lumMod val="20000"/>
-                        <a:lumOff val="80000"/>
+                      <a:schemeClr val="accent1">
+                        <a:lumMod val="40000"/>
+                        <a:lumOff val="60000"/>
                       </a:schemeClr>
                     </a:solidFill>
                   </a:tcPr>
@@ -6763,431 +3856,19 @@
                     <a:bodyPr/>
                     <a:lstStyle/>
                     <a:p>
-                      <a:pPr algn="ctr"/>
-                      <a:endParaRPr lang="en-US" dirty="0"/>
+                      <a:pPr algn="l"/>
+                      <a:r>
+                        <a:rPr lang="en-US" sz="1400" dirty="0" smtClean="0"/>
+                        <a:t>Tag</a:t>
+                      </a:r>
+                      <a:endParaRPr lang="en-US" sz="1400" dirty="0"/>
                     </a:p>
                   </a:txBody>
                   <a:tcPr>
-                    <a:lnL w="12700" cap="flat" cmpd="sng" algn="ctr">
-                      <a:solidFill>
-                        <a:schemeClr val="tx1"/>
-                      </a:solidFill>
-                      <a:prstDash val="solid"/>
-                      <a:round/>
-                      <a:headEnd type="none" w="med" len="med"/>
-                      <a:tailEnd type="none" w="med" len="med"/>
-                    </a:lnL>
-                    <a:lnR w="12700" cap="flat" cmpd="sng" algn="ctr">
-                      <a:solidFill>
-                        <a:schemeClr val="tx1"/>
-                      </a:solidFill>
-                      <a:prstDash val="solid"/>
-                      <a:round/>
-                      <a:headEnd type="none" w="med" len="med"/>
-                      <a:tailEnd type="none" w="med" len="med"/>
-                    </a:lnR>
-                    <a:lnT w="12700" cap="flat" cmpd="sng" algn="ctr">
-                      <a:solidFill>
-                        <a:schemeClr val="tx1"/>
-                      </a:solidFill>
-                      <a:prstDash val="solid"/>
-                      <a:round/>
-                      <a:headEnd type="none" w="med" len="med"/>
-                      <a:tailEnd type="none" w="med" len="med"/>
-                    </a:lnT>
-                    <a:lnB w="12700" cap="flat" cmpd="sng" algn="ctr">
-                      <a:solidFill>
-                        <a:schemeClr val="tx1"/>
-                      </a:solidFill>
-                      <a:prstDash val="solid"/>
-                      <a:round/>
-                      <a:headEnd type="none" w="med" len="med"/>
-                      <a:tailEnd type="none" w="med" len="med"/>
-                    </a:lnB>
-                    <a:lnTlToBr w="12700" cmpd="sng">
-                      <a:noFill/>
-                      <a:prstDash val="solid"/>
-                    </a:lnTlToBr>
-                    <a:lnBlToTr w="12700" cmpd="sng">
-                      <a:noFill/>
-                      <a:prstDash val="solid"/>
-                    </a:lnBlToTr>
                     <a:solidFill>
-                      <a:schemeClr val="tx2">
-                        <a:lumMod val="20000"/>
-                        <a:lumOff val="80000"/>
-                      </a:schemeClr>
-                    </a:solidFill>
-                  </a:tcPr>
-                </a:tc>
-                <a:tc>
-                  <a:txBody>
-                    <a:bodyPr/>
-                    <a:lstStyle/>
-                    <a:p>
-                      <a:pPr algn="ctr"/>
-                      <a:endParaRPr lang="en-US" dirty="0"/>
-                    </a:p>
-                  </a:txBody>
-                  <a:tcPr>
-                    <a:lnL w="12700" cap="flat" cmpd="sng" algn="ctr">
-                      <a:solidFill>
-                        <a:schemeClr val="tx1"/>
-                      </a:solidFill>
-                      <a:prstDash val="solid"/>
-                      <a:round/>
-                      <a:headEnd type="none" w="med" len="med"/>
-                      <a:tailEnd type="none" w="med" len="med"/>
-                    </a:lnL>
-                    <a:lnR w="12700" cap="flat" cmpd="sng" algn="ctr">
-                      <a:solidFill>
-                        <a:schemeClr val="tx1"/>
-                      </a:solidFill>
-                      <a:prstDash val="solid"/>
-                      <a:round/>
-                      <a:headEnd type="none" w="med" len="med"/>
-                      <a:tailEnd type="none" w="med" len="med"/>
-                    </a:lnR>
-                    <a:lnT w="12700" cap="flat" cmpd="sng" algn="ctr">
-                      <a:solidFill>
-                        <a:schemeClr val="tx1"/>
-                      </a:solidFill>
-                      <a:prstDash val="solid"/>
-                      <a:round/>
-                      <a:headEnd type="none" w="med" len="med"/>
-                      <a:tailEnd type="none" w="med" len="med"/>
-                    </a:lnT>
-                    <a:lnB w="12700" cap="flat" cmpd="sng" algn="ctr">
-                      <a:solidFill>
-                        <a:schemeClr val="tx1"/>
-                      </a:solidFill>
-                      <a:prstDash val="solid"/>
-                      <a:round/>
-                      <a:headEnd type="none" w="med" len="med"/>
-                      <a:tailEnd type="none" w="med" len="med"/>
-                    </a:lnB>
-                    <a:lnTlToBr w="12700" cmpd="sng">
-                      <a:noFill/>
-                      <a:prstDash val="solid"/>
-                    </a:lnTlToBr>
-                    <a:lnBlToTr w="12700" cmpd="sng">
-                      <a:noFill/>
-                      <a:prstDash val="solid"/>
-                    </a:lnBlToTr>
-                    <a:solidFill>
-                      <a:schemeClr val="tx2">
-                        <a:lumMod val="20000"/>
-                        <a:lumOff val="80000"/>
-                      </a:schemeClr>
-                    </a:solidFill>
-                  </a:tcPr>
-                </a:tc>
-                <a:tc>
-                  <a:txBody>
-                    <a:bodyPr/>
-                    <a:lstStyle/>
-                    <a:p>
-                      <a:pPr algn="ctr"/>
-                      <a:endParaRPr lang="en-US"/>
-                    </a:p>
-                  </a:txBody>
-                  <a:tcPr>
-                    <a:lnL w="12700" cap="flat" cmpd="sng" algn="ctr">
-                      <a:solidFill>
-                        <a:schemeClr val="tx1"/>
-                      </a:solidFill>
-                      <a:prstDash val="solid"/>
-                      <a:round/>
-                      <a:headEnd type="none" w="med" len="med"/>
-                      <a:tailEnd type="none" w="med" len="med"/>
-                    </a:lnL>
-                    <a:lnR w="12700" cap="flat" cmpd="sng" algn="ctr">
-                      <a:solidFill>
-                        <a:schemeClr val="tx1"/>
-                      </a:solidFill>
-                      <a:prstDash val="solid"/>
-                      <a:round/>
-                      <a:headEnd type="none" w="med" len="med"/>
-                      <a:tailEnd type="none" w="med" len="med"/>
-                    </a:lnR>
-                    <a:lnT w="12700" cap="flat" cmpd="sng" algn="ctr">
-                      <a:solidFill>
-                        <a:schemeClr val="tx1"/>
-                      </a:solidFill>
-                      <a:prstDash val="solid"/>
-                      <a:round/>
-                      <a:headEnd type="none" w="med" len="med"/>
-                      <a:tailEnd type="none" w="med" len="med"/>
-                    </a:lnT>
-                    <a:lnB w="12700" cap="flat" cmpd="sng" algn="ctr">
-                      <a:solidFill>
-                        <a:schemeClr val="tx1"/>
-                      </a:solidFill>
-                      <a:prstDash val="solid"/>
-                      <a:round/>
-                      <a:headEnd type="none" w="med" len="med"/>
-                      <a:tailEnd type="none" w="med" len="med"/>
-                    </a:lnB>
-                    <a:lnTlToBr w="12700" cmpd="sng">
-                      <a:noFill/>
-                      <a:prstDash val="solid"/>
-                    </a:lnTlToBr>
-                    <a:lnBlToTr w="12700" cmpd="sng">
-                      <a:noFill/>
-                      <a:prstDash val="solid"/>
-                    </a:lnBlToTr>
-                    <a:solidFill>
-                      <a:schemeClr val="tx2">
-                        <a:lumMod val="20000"/>
-                        <a:lumOff val="80000"/>
-                      </a:schemeClr>
-                    </a:solidFill>
-                  </a:tcPr>
-                </a:tc>
-                <a:tc>
-                  <a:txBody>
-                    <a:bodyPr/>
-                    <a:lstStyle/>
-                    <a:p>
-                      <a:pPr algn="ctr"/>
-                      <a:endParaRPr lang="en-US" dirty="0"/>
-                    </a:p>
-                  </a:txBody>
-                  <a:tcPr>
-                    <a:lnL w="12700" cap="flat" cmpd="sng" algn="ctr">
-                      <a:solidFill>
-                        <a:schemeClr val="tx1"/>
-                      </a:solidFill>
-                      <a:prstDash val="solid"/>
-                      <a:round/>
-                      <a:headEnd type="none" w="med" len="med"/>
-                      <a:tailEnd type="none" w="med" len="med"/>
-                    </a:lnL>
-                    <a:lnR w="12700" cap="flat" cmpd="sng" algn="ctr">
-                      <a:solidFill>
-                        <a:schemeClr val="tx1"/>
-                      </a:solidFill>
-                      <a:prstDash val="solid"/>
-                      <a:round/>
-                      <a:headEnd type="none" w="med" len="med"/>
-                      <a:tailEnd type="none" w="med" len="med"/>
-                    </a:lnR>
-                    <a:lnT w="12700" cap="flat" cmpd="sng" algn="ctr">
-                      <a:solidFill>
-                        <a:schemeClr val="tx1"/>
-                      </a:solidFill>
-                      <a:prstDash val="solid"/>
-                      <a:round/>
-                      <a:headEnd type="none" w="med" len="med"/>
-                      <a:tailEnd type="none" w="med" len="med"/>
-                    </a:lnT>
-                    <a:lnB w="12700" cap="flat" cmpd="sng" algn="ctr">
-                      <a:solidFill>
-                        <a:schemeClr val="tx1"/>
-                      </a:solidFill>
-                      <a:prstDash val="solid"/>
-                      <a:round/>
-                      <a:headEnd type="none" w="med" len="med"/>
-                      <a:tailEnd type="none" w="med" len="med"/>
-                    </a:lnB>
-                    <a:lnTlToBr w="12700" cmpd="sng">
-                      <a:noFill/>
-                      <a:prstDash val="solid"/>
-                    </a:lnTlToBr>
-                    <a:lnBlToTr w="12700" cmpd="sng">
-                      <a:noFill/>
-                      <a:prstDash val="solid"/>
-                    </a:lnBlToTr>
-                    <a:solidFill>
-                      <a:schemeClr val="tx2">
-                        <a:lumMod val="20000"/>
-                        <a:lumOff val="80000"/>
-                      </a:schemeClr>
-                    </a:solidFill>
-                  </a:tcPr>
-                </a:tc>
-                <a:tc>
-                  <a:txBody>
-                    <a:bodyPr/>
-                    <a:lstStyle/>
-                    <a:p>
-                      <a:pPr algn="ctr"/>
-                      <a:endParaRPr lang="en-US" dirty="0"/>
-                    </a:p>
-                  </a:txBody>
-                  <a:tcPr>
-                    <a:lnL w="12700" cap="flat" cmpd="sng" algn="ctr">
-                      <a:solidFill>
-                        <a:schemeClr val="tx1"/>
-                      </a:solidFill>
-                      <a:prstDash val="solid"/>
-                      <a:round/>
-                      <a:headEnd type="none" w="med" len="med"/>
-                      <a:tailEnd type="none" w="med" len="med"/>
-                    </a:lnL>
-                    <a:lnR w="12700" cap="flat" cmpd="sng" algn="ctr">
-                      <a:solidFill>
-                        <a:schemeClr val="tx1"/>
-                      </a:solidFill>
-                      <a:prstDash val="solid"/>
-                      <a:round/>
-                      <a:headEnd type="none" w="med" len="med"/>
-                      <a:tailEnd type="none" w="med" len="med"/>
-                    </a:lnR>
-                    <a:lnT w="12700" cap="flat" cmpd="sng" algn="ctr">
-                      <a:solidFill>
-                        <a:schemeClr val="tx1"/>
-                      </a:solidFill>
-                      <a:prstDash val="solid"/>
-                      <a:round/>
-                      <a:headEnd type="none" w="med" len="med"/>
-                      <a:tailEnd type="none" w="med" len="med"/>
-                    </a:lnT>
-                    <a:lnB w="12700" cap="flat" cmpd="sng" algn="ctr">
-                      <a:solidFill>
-                        <a:schemeClr val="tx1"/>
-                      </a:solidFill>
-                      <a:prstDash val="solid"/>
-                      <a:round/>
-                      <a:headEnd type="none" w="med" len="med"/>
-                      <a:tailEnd type="none" w="med" len="med"/>
-                    </a:lnB>
-                    <a:lnTlToBr w="12700" cmpd="sng">
-                      <a:noFill/>
-                      <a:prstDash val="solid"/>
-                    </a:lnTlToBr>
-                    <a:lnBlToTr w="12700" cmpd="sng">
-                      <a:noFill/>
-                      <a:prstDash val="solid"/>
-                    </a:lnBlToTr>
-                    <a:solidFill>
-                      <a:schemeClr val="tx2">
-                        <a:lumMod val="20000"/>
-                        <a:lumOff val="80000"/>
-                      </a:schemeClr>
-                    </a:solidFill>
-                  </a:tcPr>
-                </a:tc>
-                <a:tc>
-                  <a:txBody>
-                    <a:bodyPr/>
-                    <a:lstStyle/>
-                    <a:p>
-                      <a:pPr algn="ctr"/>
-                      <a:endParaRPr lang="en-US"/>
-                    </a:p>
-                  </a:txBody>
-                  <a:tcPr>
-                    <a:lnL w="12700" cap="flat" cmpd="sng" algn="ctr">
-                      <a:solidFill>
-                        <a:schemeClr val="tx1"/>
-                      </a:solidFill>
-                      <a:prstDash val="solid"/>
-                      <a:round/>
-                      <a:headEnd type="none" w="med" len="med"/>
-                      <a:tailEnd type="none" w="med" len="med"/>
-                    </a:lnL>
-                    <a:lnR w="12700" cap="flat" cmpd="sng" algn="ctr">
-                      <a:solidFill>
-                        <a:schemeClr val="tx1"/>
-                      </a:solidFill>
-                      <a:prstDash val="solid"/>
-                      <a:round/>
-                      <a:headEnd type="none" w="med" len="med"/>
-                      <a:tailEnd type="none" w="med" len="med"/>
-                    </a:lnR>
-                    <a:lnT w="12700" cap="flat" cmpd="sng" algn="ctr">
-                      <a:solidFill>
-                        <a:schemeClr val="tx1"/>
-                      </a:solidFill>
-                      <a:prstDash val="solid"/>
-                      <a:round/>
-                      <a:headEnd type="none" w="med" len="med"/>
-                      <a:tailEnd type="none" w="med" len="med"/>
-                    </a:lnT>
-                    <a:lnB w="12700" cap="flat" cmpd="sng" algn="ctr">
-                      <a:solidFill>
-                        <a:schemeClr val="tx1"/>
-                      </a:solidFill>
-                      <a:prstDash val="solid"/>
-                      <a:round/>
-                      <a:headEnd type="none" w="med" len="med"/>
-                      <a:tailEnd type="none" w="med" len="med"/>
-                    </a:lnB>
-                    <a:lnTlToBr w="12700" cmpd="sng">
-                      <a:noFill/>
-                      <a:prstDash val="solid"/>
-                    </a:lnTlToBr>
-                    <a:lnBlToTr w="12700" cmpd="sng">
-                      <a:noFill/>
-                      <a:prstDash val="solid"/>
-                    </a:lnBlToTr>
-                    <a:solidFill>
-                      <a:schemeClr val="tx2">
-                        <a:lumMod val="20000"/>
-                        <a:lumOff val="80000"/>
-                      </a:schemeClr>
-                    </a:solidFill>
-                  </a:tcPr>
-                </a:tc>
-                <a:tc>
-                  <a:txBody>
-                    <a:bodyPr/>
-                    <a:lstStyle/>
-                    <a:p>
-                      <a:pPr algn="ctr"/>
-                      <a:endParaRPr lang="en-US" dirty="0"/>
-                    </a:p>
-                  </a:txBody>
-                  <a:tcPr>
-                    <a:lnL w="12700" cap="flat" cmpd="sng" algn="ctr">
-                      <a:solidFill>
-                        <a:schemeClr val="tx1"/>
-                      </a:solidFill>
-                      <a:prstDash val="solid"/>
-                      <a:round/>
-                      <a:headEnd type="none" w="med" len="med"/>
-                      <a:tailEnd type="none" w="med" len="med"/>
-                    </a:lnL>
-                    <a:lnR w="12700" cap="flat" cmpd="sng" algn="ctr">
-                      <a:solidFill>
-                        <a:schemeClr val="tx1"/>
-                      </a:solidFill>
-                      <a:prstDash val="solid"/>
-                      <a:round/>
-                      <a:headEnd type="none" w="med" len="med"/>
-                      <a:tailEnd type="none" w="med" len="med"/>
-                    </a:lnR>
-                    <a:lnT w="12700" cap="flat" cmpd="sng" algn="ctr">
-                      <a:solidFill>
-                        <a:schemeClr val="tx1"/>
-                      </a:solidFill>
-                      <a:prstDash val="solid"/>
-                      <a:round/>
-                      <a:headEnd type="none" w="med" len="med"/>
-                      <a:tailEnd type="none" w="med" len="med"/>
-                    </a:lnT>
-                    <a:lnB w="12700" cap="flat" cmpd="sng" algn="ctr">
-                      <a:solidFill>
-                        <a:schemeClr val="tx1"/>
-                      </a:solidFill>
-                      <a:prstDash val="solid"/>
-                      <a:round/>
-                      <a:headEnd type="none" w="med" len="med"/>
-                      <a:tailEnd type="none" w="med" len="med"/>
-                    </a:lnB>
-                    <a:lnTlToBr w="12700" cmpd="sng">
-                      <a:noFill/>
-                      <a:prstDash val="solid"/>
-                    </a:lnTlToBr>
-                    <a:lnBlToTr w="12700" cmpd="sng">
-                      <a:noFill/>
-                      <a:prstDash val="solid"/>
-                    </a:lnBlToTr>
-                    <a:solidFill>
-                      <a:schemeClr val="tx2">
-                        <a:lumMod val="20000"/>
-                        <a:lumOff val="80000"/>
+                      <a:schemeClr val="accent1">
+                        <a:lumMod val="40000"/>
+                        <a:lumOff val="60000"/>
                       </a:schemeClr>
                     </a:solidFill>
                   </a:tcPr>
@@ -7822,7 +4503,7 @@
         </p:nvSpPr>
         <p:spPr>
           <a:xfrm>
-            <a:off x="1905000" y="5181600"/>
+            <a:off x="1905000" y="5105400"/>
             <a:ext cx="762000" cy="276999"/>
           </a:xfrm>
           <a:prstGeom prst="rect">
@@ -9365,10 +6046,18 @@
                     <a:p>
                       <a:pPr algn="ctr"/>
                       <a:r>
-                        <a:rPr lang="en-US" sz="1400" dirty="0" err="1" smtClean="0"/>
+                        <a:rPr lang="en-US" sz="1400" b="0" dirty="0" err="1" smtClean="0">
+                          <a:solidFill>
+                            <a:schemeClr val="tx1"/>
+                          </a:solidFill>
+                        </a:rPr>
                         <a:t>Addr</a:t>
                       </a:r>
-                      <a:endParaRPr lang="en-US" sz="1400" dirty="0"/>
+                      <a:endParaRPr lang="en-US" sz="1400" b="0" dirty="0">
+                        <a:solidFill>
+                          <a:schemeClr val="tx1"/>
+                        </a:solidFill>
+                      </a:endParaRPr>
                     </a:p>
                   </a:txBody>
                   <a:tcPr>
@@ -9417,8 +6106,9 @@
                       <a:prstDash val="solid"/>
                     </a:lnBlToTr>
                     <a:solidFill>
-                      <a:schemeClr val="bg1">
-                        <a:lumMod val="85000"/>
+                      <a:schemeClr val="accent1">
+                        <a:lumMod val="40000"/>
+                        <a:lumOff val="60000"/>
                       </a:schemeClr>
                     </a:solidFill>
                   </a:tcPr>
@@ -9430,10 +6120,18 @@
                     <a:p>
                       <a:pPr algn="ctr"/>
                       <a:r>
-                        <a:rPr lang="en-US" sz="1400" dirty="0" smtClean="0"/>
-                        <a:t>ID</a:t>
+                        <a:rPr lang="en-US" sz="1400" b="0" dirty="0" smtClean="0">
+                          <a:solidFill>
+                            <a:schemeClr val="tx1"/>
+                          </a:solidFill>
+                        </a:rPr>
+                        <a:t>id</a:t>
                       </a:r>
-                      <a:endParaRPr lang="en-US" sz="1400" dirty="0"/>
+                      <a:endParaRPr lang="en-US" sz="1400" b="0" dirty="0">
+                        <a:solidFill>
+                          <a:schemeClr val="tx1"/>
+                        </a:solidFill>
+                      </a:endParaRPr>
                     </a:p>
                   </a:txBody>
                   <a:tcPr>
@@ -9482,8 +6180,9 @@
                       <a:prstDash val="solid"/>
                     </a:lnBlToTr>
                     <a:solidFill>
-                      <a:schemeClr val="bg1">
-                        <a:lumMod val="85000"/>
+                      <a:schemeClr val="accent1">
+                        <a:lumMod val="40000"/>
+                        <a:lumOff val="60000"/>
                       </a:schemeClr>
                     </a:solidFill>
                   </a:tcPr>
@@ -9495,10 +6194,80 @@
                     <a:p>
                       <a:pPr algn="l"/>
                       <a:r>
-                        <a:rPr lang="en-US" sz="1400" dirty="0" smtClean="0"/>
+                        <a:rPr lang="en-US" sz="1400" b="0" dirty="0" smtClean="0">
+                          <a:solidFill>
+                            <a:schemeClr val="tx1"/>
+                          </a:solidFill>
+                        </a:rPr>
                         <a:t>data</a:t>
                       </a:r>
-                      <a:endParaRPr lang="en-US" sz="1400" dirty="0"/>
+                      <a:endParaRPr lang="en-US" sz="1400" b="0" dirty="0">
+                        <a:solidFill>
+                          <a:schemeClr val="tx1"/>
+                        </a:solidFill>
+                      </a:endParaRPr>
+                    </a:p>
+                  </a:txBody>
+                  <a:tcPr>
+                    <a:lnL w="12700" cap="flat" cmpd="sng" algn="ctr">
+                      <a:solidFill>
+                        <a:schemeClr val="tx1"/>
+                      </a:solidFill>
+                      <a:prstDash val="solid"/>
+                      <a:round/>
+                      <a:headEnd type="none" w="med" len="med"/>
+                      <a:tailEnd type="none" w="med" len="med"/>
+                    </a:lnL>
+                    <a:lnR w="12700" cap="flat" cmpd="sng" algn="ctr">
+                      <a:solidFill>
+                        <a:schemeClr val="tx1"/>
+                      </a:solidFill>
+                      <a:prstDash val="solid"/>
+                      <a:round/>
+                      <a:headEnd type="none" w="med" len="med"/>
+                      <a:tailEnd type="none" w="med" len="med"/>
+                    </a:lnR>
+                    <a:lnT w="12700" cap="flat" cmpd="sng" algn="ctr">
+                      <a:solidFill>
+                        <a:schemeClr val="tx1"/>
+                      </a:solidFill>
+                      <a:prstDash val="solid"/>
+                      <a:round/>
+                      <a:headEnd type="none" w="med" len="med"/>
+                      <a:tailEnd type="none" w="med" len="med"/>
+                    </a:lnT>
+                    <a:lnB w="12700" cap="flat" cmpd="sng" algn="ctr">
+                      <a:solidFill>
+                        <a:schemeClr val="tx1"/>
+                      </a:solidFill>
+                      <a:prstDash val="solid"/>
+                      <a:round/>
+                      <a:headEnd type="none" w="med" len="med"/>
+                      <a:tailEnd type="none" w="med" len="med"/>
+                    </a:lnB>
+                    <a:lnTlToBr w="12700" cmpd="sng">
+                      <a:noFill/>
+                      <a:prstDash val="solid"/>
+                    </a:lnTlToBr>
+                    <a:lnBlToTr w="12700" cmpd="sng">
+                      <a:noFill/>
+                      <a:prstDash val="solid"/>
+                    </a:lnBlToTr>
+                    <a:solidFill>
+                      <a:schemeClr val="accent1">
+                        <a:lumMod val="40000"/>
+                        <a:lumOff val="60000"/>
+                      </a:schemeClr>
+                    </a:solidFill>
+                  </a:tcPr>
+                </a:tc>
+                <a:tc hMerge="1">
+                  <a:txBody>
+                    <a:bodyPr/>
+                    <a:lstStyle/>
+                    <a:p>
+                      <a:pPr algn="ctr"/>
+                      <a:endParaRPr lang="en-US" dirty="0"/>
                     </a:p>
                   </a:txBody>
                   <a:tcPr>
@@ -9614,6 +6383,80 @@
                     </a:solidFill>
                   </a:tcPr>
                 </a:tc>
+                <a:tc gridSpan="2">
+                  <a:txBody>
+                    <a:bodyPr/>
+                    <a:lstStyle/>
+                    <a:p>
+                      <a:pPr algn="l"/>
+                      <a:r>
+                        <a:rPr lang="en-US" sz="1400" b="0" dirty="0" smtClean="0">
+                          <a:solidFill>
+                            <a:schemeClr val="tx1"/>
+                          </a:solidFill>
+                        </a:rPr>
+                        <a:t>r/w</a:t>
+                      </a:r>
+                      <a:endParaRPr lang="en-US" sz="1400" b="0" dirty="0">
+                        <a:solidFill>
+                          <a:schemeClr val="tx1"/>
+                        </a:solidFill>
+                      </a:endParaRPr>
+                    </a:p>
+                  </a:txBody>
+                  <a:tcPr>
+                    <a:lnL w="12700" cap="flat" cmpd="sng" algn="ctr">
+                      <a:solidFill>
+                        <a:schemeClr val="tx1"/>
+                      </a:solidFill>
+                      <a:prstDash val="solid"/>
+                      <a:round/>
+                      <a:headEnd type="none" w="med" len="med"/>
+                      <a:tailEnd type="none" w="med" len="med"/>
+                    </a:lnL>
+                    <a:lnR w="12700" cap="flat" cmpd="sng" algn="ctr">
+                      <a:solidFill>
+                        <a:schemeClr val="tx1"/>
+                      </a:solidFill>
+                      <a:prstDash val="solid"/>
+                      <a:round/>
+                      <a:headEnd type="none" w="med" len="med"/>
+                      <a:tailEnd type="none" w="med" len="med"/>
+                    </a:lnR>
+                    <a:lnT w="12700" cap="flat" cmpd="sng" algn="ctr">
+                      <a:solidFill>
+                        <a:schemeClr val="tx1"/>
+                      </a:solidFill>
+                      <a:prstDash val="solid"/>
+                      <a:round/>
+                      <a:headEnd type="none" w="med" len="med"/>
+                      <a:tailEnd type="none" w="med" len="med"/>
+                    </a:lnT>
+                    <a:lnB w="12700" cap="flat" cmpd="sng" algn="ctr">
+                      <a:solidFill>
+                        <a:schemeClr val="tx1"/>
+                      </a:solidFill>
+                      <a:prstDash val="solid"/>
+                      <a:round/>
+                      <a:headEnd type="none" w="med" len="med"/>
+                      <a:tailEnd type="none" w="med" len="med"/>
+                    </a:lnB>
+                    <a:lnTlToBr w="12700" cmpd="sng">
+                      <a:noFill/>
+                      <a:prstDash val="solid"/>
+                    </a:lnTlToBr>
+                    <a:lnBlToTr w="12700" cmpd="sng">
+                      <a:noFill/>
+                      <a:prstDash val="solid"/>
+                    </a:lnBlToTr>
+                    <a:solidFill>
+                      <a:schemeClr val="accent1">
+                        <a:lumMod val="40000"/>
+                        <a:lumOff val="60000"/>
+                      </a:schemeClr>
+                    </a:solidFill>
+                  </a:tcPr>
+                </a:tc>
                 <a:tc hMerge="1">
                   <a:txBody>
                     <a:bodyPr/>
@@ -9682,10 +6525,18 @@
                     <a:p>
                       <a:pPr algn="l"/>
                       <a:r>
-                        <a:rPr lang="en-US" sz="1400" dirty="0" smtClean="0"/>
-                        <a:t>r/w</a:t>
+                        <a:rPr lang="en-US" sz="1400" b="0" dirty="0" smtClean="0">
+                          <a:solidFill>
+                            <a:schemeClr val="tx1"/>
+                          </a:solidFill>
+                        </a:rPr>
+                        <a:t>V</a:t>
                       </a:r>
-                      <a:endParaRPr lang="en-US" sz="1400" dirty="0"/>
+                      <a:endParaRPr lang="en-US" sz="1400" b="0" dirty="0">
+                        <a:solidFill>
+                          <a:schemeClr val="tx1"/>
+                        </a:solidFill>
+                      </a:endParaRPr>
                     </a:p>
                   </a:txBody>
                   <a:tcPr>
@@ -9734,134 +6585,9 @@
                       <a:prstDash val="solid"/>
                     </a:lnBlToTr>
                     <a:solidFill>
-                      <a:schemeClr val="bg1">
-                        <a:lumMod val="85000"/>
-                      </a:schemeClr>
-                    </a:solidFill>
-                  </a:tcPr>
-                </a:tc>
-                <a:tc hMerge="1">
-                  <a:txBody>
-                    <a:bodyPr/>
-                    <a:lstStyle/>
-                    <a:p>
-                      <a:pPr algn="ctr"/>
-                      <a:endParaRPr lang="en-US" dirty="0"/>
-                    </a:p>
-                  </a:txBody>
-                  <a:tcPr>
-                    <a:lnL w="12700" cap="flat" cmpd="sng" algn="ctr">
-                      <a:solidFill>
-                        <a:schemeClr val="tx1"/>
-                      </a:solidFill>
-                      <a:prstDash val="solid"/>
-                      <a:round/>
-                      <a:headEnd type="none" w="med" len="med"/>
-                      <a:tailEnd type="none" w="med" len="med"/>
-                    </a:lnL>
-                    <a:lnR w="12700" cap="flat" cmpd="sng" algn="ctr">
-                      <a:solidFill>
-                        <a:schemeClr val="tx1"/>
-                      </a:solidFill>
-                      <a:prstDash val="solid"/>
-                      <a:round/>
-                      <a:headEnd type="none" w="med" len="med"/>
-                      <a:tailEnd type="none" w="med" len="med"/>
-                    </a:lnR>
-                    <a:lnT w="12700" cap="flat" cmpd="sng" algn="ctr">
-                      <a:solidFill>
-                        <a:schemeClr val="tx1"/>
-                      </a:solidFill>
-                      <a:prstDash val="solid"/>
-                      <a:round/>
-                      <a:headEnd type="none" w="med" len="med"/>
-                      <a:tailEnd type="none" w="med" len="med"/>
-                    </a:lnT>
-                    <a:lnB w="12700" cap="flat" cmpd="sng" algn="ctr">
-                      <a:solidFill>
-                        <a:schemeClr val="tx1"/>
-                      </a:solidFill>
-                      <a:prstDash val="solid"/>
-                      <a:round/>
-                      <a:headEnd type="none" w="med" len="med"/>
-                      <a:tailEnd type="none" w="med" len="med"/>
-                    </a:lnB>
-                    <a:lnTlToBr w="12700" cmpd="sng">
-                      <a:noFill/>
-                      <a:prstDash val="solid"/>
-                    </a:lnTlToBr>
-                    <a:lnBlToTr w="12700" cmpd="sng">
-                      <a:noFill/>
-                      <a:prstDash val="solid"/>
-                    </a:lnBlToTr>
-                    <a:solidFill>
-                      <a:schemeClr val="bg1">
-                        <a:lumMod val="85000"/>
-                      </a:schemeClr>
-                    </a:solidFill>
-                  </a:tcPr>
-                </a:tc>
-                <a:tc gridSpan="2">
-                  <a:txBody>
-                    <a:bodyPr/>
-                    <a:lstStyle/>
-                    <a:p>
-                      <a:pPr algn="l"/>
-                      <a:r>
-                        <a:rPr lang="en-US" sz="1400" dirty="0" smtClean="0"/>
-                        <a:t>V</a:t>
-                      </a:r>
-                      <a:endParaRPr lang="en-US" sz="1400" dirty="0"/>
-                    </a:p>
-                  </a:txBody>
-                  <a:tcPr>
-                    <a:lnL w="12700" cap="flat" cmpd="sng" algn="ctr">
-                      <a:solidFill>
-                        <a:schemeClr val="tx1"/>
-                      </a:solidFill>
-                      <a:prstDash val="solid"/>
-                      <a:round/>
-                      <a:headEnd type="none" w="med" len="med"/>
-                      <a:tailEnd type="none" w="med" len="med"/>
-                    </a:lnL>
-                    <a:lnR w="12700" cap="flat" cmpd="sng" algn="ctr">
-                      <a:solidFill>
-                        <a:schemeClr val="tx1"/>
-                      </a:solidFill>
-                      <a:prstDash val="solid"/>
-                      <a:round/>
-                      <a:headEnd type="none" w="med" len="med"/>
-                      <a:tailEnd type="none" w="med" len="med"/>
-                    </a:lnR>
-                    <a:lnT w="12700" cap="flat" cmpd="sng" algn="ctr">
-                      <a:solidFill>
-                        <a:schemeClr val="tx1"/>
-                      </a:solidFill>
-                      <a:prstDash val="solid"/>
-                      <a:round/>
-                      <a:headEnd type="none" w="med" len="med"/>
-                      <a:tailEnd type="none" w="med" len="med"/>
-                    </a:lnT>
-                    <a:lnB w="12700" cap="flat" cmpd="sng" algn="ctr">
-                      <a:solidFill>
-                        <a:schemeClr val="tx1"/>
-                      </a:solidFill>
-                      <a:prstDash val="solid"/>
-                      <a:round/>
-                      <a:headEnd type="none" w="med" len="med"/>
-                      <a:tailEnd type="none" w="med" len="med"/>
-                    </a:lnB>
-                    <a:lnTlToBr w="12700" cmpd="sng">
-                      <a:noFill/>
-                      <a:prstDash val="solid"/>
-                    </a:lnTlToBr>
-                    <a:lnBlToTr w="12700" cmpd="sng">
-                      <a:noFill/>
-                      <a:prstDash val="solid"/>
-                    </a:lnBlToTr>
-                    <a:solidFill>
-                      <a:schemeClr val="bg1">
-                        <a:lumMod val="85000"/>
+                      <a:schemeClr val="accent1">
+                        <a:lumMod val="40000"/>
+                        <a:lumOff val="60000"/>
                       </a:schemeClr>
                     </a:solidFill>
                   </a:tcPr>
@@ -9941,7 +6667,7 @@
           <p:nvPr/>
         </p:nvGraphicFramePr>
         <p:xfrm>
-          <a:off x="762000" y="6248400"/>
+          <a:off x="6019800" y="5791200"/>
           <a:ext cx="2550643" cy="304800"/>
         </p:xfrm>
         <a:graphic>
@@ -10162,6 +6888,126 @@
           </a:graphicData>
         </a:graphic>
       </p:graphicFrame>
+      <p:sp>
+        <p:nvSpPr>
+          <p:cNvPr id="72" name="TextBox 71"/>
+          <p:cNvSpPr txBox="1"/>
+          <p:nvPr/>
+        </p:nvSpPr>
+        <p:spPr>
+          <a:xfrm>
+            <a:off x="1600200" y="1828800"/>
+            <a:ext cx="1600200" cy="369332"/>
+          </a:xfrm>
+          <a:prstGeom prst="rect">
+            <a:avLst/>
+          </a:prstGeom>
+          <a:noFill/>
+        </p:spPr>
+        <p:txBody>
+          <a:bodyPr wrap="square" rtlCol="0">
+            <a:spAutoFit/>
+          </a:bodyPr>
+          <a:lstStyle/>
+          <a:p>
+            <a:r>
+              <a:rPr lang="en-US" dirty="0" smtClean="0"/>
+              <a:t>Tag RAM</a:t>
+            </a:r>
+            <a:endParaRPr lang="en-US" dirty="0"/>
+          </a:p>
+        </p:txBody>
+      </p:sp>
+      <p:sp>
+        <p:nvSpPr>
+          <p:cNvPr id="73" name="TextBox 72"/>
+          <p:cNvSpPr txBox="1"/>
+          <p:nvPr/>
+        </p:nvSpPr>
+        <p:spPr>
+          <a:xfrm>
+            <a:off x="5791200" y="1828800"/>
+            <a:ext cx="1600200" cy="369332"/>
+          </a:xfrm>
+          <a:prstGeom prst="rect">
+            <a:avLst/>
+          </a:prstGeom>
+          <a:noFill/>
+        </p:spPr>
+        <p:txBody>
+          <a:bodyPr wrap="square" rtlCol="0">
+            <a:spAutoFit/>
+          </a:bodyPr>
+          <a:lstStyle/>
+          <a:p>
+            <a:r>
+              <a:rPr lang="en-US" dirty="0" smtClean="0"/>
+              <a:t>Data RAM</a:t>
+            </a:r>
+            <a:endParaRPr lang="en-US" dirty="0"/>
+          </a:p>
+        </p:txBody>
+      </p:sp>
+      <p:sp>
+        <p:nvSpPr>
+          <p:cNvPr id="74" name="TextBox 73"/>
+          <p:cNvSpPr txBox="1"/>
+          <p:nvPr/>
+        </p:nvSpPr>
+        <p:spPr>
+          <a:xfrm>
+            <a:off x="6019800" y="5486400"/>
+            <a:ext cx="1371600" cy="276999"/>
+          </a:xfrm>
+          <a:prstGeom prst="rect">
+            <a:avLst/>
+          </a:prstGeom>
+          <a:noFill/>
+        </p:spPr>
+        <p:txBody>
+          <a:bodyPr wrap="square" rtlCol="0">
+            <a:spAutoFit/>
+          </a:bodyPr>
+          <a:lstStyle/>
+          <a:p>
+            <a:r>
+              <a:rPr lang="en-US" sz="1200" dirty="0" smtClean="0"/>
+              <a:t>Address Format</a:t>
+            </a:r>
+            <a:endParaRPr lang="en-US" sz="1200" dirty="0"/>
+          </a:p>
+        </p:txBody>
+      </p:sp>
+      <p:sp>
+        <p:nvSpPr>
+          <p:cNvPr id="75" name="TextBox 74"/>
+          <p:cNvSpPr txBox="1"/>
+          <p:nvPr/>
+        </p:nvSpPr>
+        <p:spPr>
+          <a:xfrm>
+            <a:off x="5562600" y="3276600"/>
+            <a:ext cx="990600" cy="461665"/>
+          </a:xfrm>
+          <a:prstGeom prst="rect">
+            <a:avLst/>
+          </a:prstGeom>
+          <a:noFill/>
+        </p:spPr>
+        <p:txBody>
+          <a:bodyPr wrap="square" rtlCol="0">
+            <a:spAutoFit/>
+          </a:bodyPr>
+          <a:lstStyle/>
+          <a:p>
+            <a:r>
+              <a:rPr lang="en-US" sz="1200" dirty="0" smtClean="0"/>
+              <a:t>Control Signals</a:t>
+            </a:r>
+            <a:endParaRPr lang="en-US" sz="1200" dirty="0"/>
+          </a:p>
+        </p:txBody>
+      </p:sp>
     </p:spTree>
   </p:cSld>
   <p:clrMapOvr>

</xml_diff>